<commit_message>
.gitignore, update GHdiagram, session file
</commit_message>
<xml_diff>
--- a/doc/Figures/temp/tempStateDiagramGH.pptx
+++ b/doc/Figures/temp/tempStateDiagramGH.pptx
@@ -261,7 +261,7 @@
           <a:p>
             <a:fld id="{786B9184-6E77-4DA2-9A6A-FCC44F32A373}" type="datetimeFigureOut">
               <a:rPr lang="en-GB" smtClean="0"/>
-              <a:t>27/10/2021</a:t>
+              <a:t>10/11/2021</a:t>
             </a:fld>
             <a:endParaRPr lang="en-GB"/>
           </a:p>
@@ -461,7 +461,7 @@
           <a:p>
             <a:fld id="{786B9184-6E77-4DA2-9A6A-FCC44F32A373}" type="datetimeFigureOut">
               <a:rPr lang="en-GB" smtClean="0"/>
-              <a:t>27/10/2021</a:t>
+              <a:t>10/11/2021</a:t>
             </a:fld>
             <a:endParaRPr lang="en-GB"/>
           </a:p>
@@ -671,7 +671,7 @@
           <a:p>
             <a:fld id="{786B9184-6E77-4DA2-9A6A-FCC44F32A373}" type="datetimeFigureOut">
               <a:rPr lang="en-GB" smtClean="0"/>
-              <a:t>27/10/2021</a:t>
+              <a:t>10/11/2021</a:t>
             </a:fld>
             <a:endParaRPr lang="en-GB"/>
           </a:p>
@@ -871,7 +871,7 @@
           <a:p>
             <a:fld id="{786B9184-6E77-4DA2-9A6A-FCC44F32A373}" type="datetimeFigureOut">
               <a:rPr lang="en-GB" smtClean="0"/>
-              <a:t>27/10/2021</a:t>
+              <a:t>10/11/2021</a:t>
             </a:fld>
             <a:endParaRPr lang="en-GB"/>
           </a:p>
@@ -1147,7 +1147,7 @@
           <a:p>
             <a:fld id="{786B9184-6E77-4DA2-9A6A-FCC44F32A373}" type="datetimeFigureOut">
               <a:rPr lang="en-GB" smtClean="0"/>
-              <a:t>27/10/2021</a:t>
+              <a:t>10/11/2021</a:t>
             </a:fld>
             <a:endParaRPr lang="en-GB"/>
           </a:p>
@@ -1415,7 +1415,7 @@
           <a:p>
             <a:fld id="{786B9184-6E77-4DA2-9A6A-FCC44F32A373}" type="datetimeFigureOut">
               <a:rPr lang="en-GB" smtClean="0"/>
-              <a:t>27/10/2021</a:t>
+              <a:t>10/11/2021</a:t>
             </a:fld>
             <a:endParaRPr lang="en-GB"/>
           </a:p>
@@ -1830,7 +1830,7 @@
           <a:p>
             <a:fld id="{786B9184-6E77-4DA2-9A6A-FCC44F32A373}" type="datetimeFigureOut">
               <a:rPr lang="en-GB" smtClean="0"/>
-              <a:t>27/10/2021</a:t>
+              <a:t>10/11/2021</a:t>
             </a:fld>
             <a:endParaRPr lang="en-GB"/>
           </a:p>
@@ -1972,7 +1972,7 @@
           <a:p>
             <a:fld id="{786B9184-6E77-4DA2-9A6A-FCC44F32A373}" type="datetimeFigureOut">
               <a:rPr lang="en-GB" smtClean="0"/>
-              <a:t>27/10/2021</a:t>
+              <a:t>10/11/2021</a:t>
             </a:fld>
             <a:endParaRPr lang="en-GB"/>
           </a:p>
@@ -2085,7 +2085,7 @@
           <a:p>
             <a:fld id="{786B9184-6E77-4DA2-9A6A-FCC44F32A373}" type="datetimeFigureOut">
               <a:rPr lang="en-GB" smtClean="0"/>
-              <a:t>27/10/2021</a:t>
+              <a:t>10/11/2021</a:t>
             </a:fld>
             <a:endParaRPr lang="en-GB"/>
           </a:p>
@@ -2398,7 +2398,7 @@
           <a:p>
             <a:fld id="{786B9184-6E77-4DA2-9A6A-FCC44F32A373}" type="datetimeFigureOut">
               <a:rPr lang="en-GB" smtClean="0"/>
-              <a:t>27/10/2021</a:t>
+              <a:t>10/11/2021</a:t>
             </a:fld>
             <a:endParaRPr lang="en-GB"/>
           </a:p>
@@ -2687,7 +2687,7 @@
           <a:p>
             <a:fld id="{786B9184-6E77-4DA2-9A6A-FCC44F32A373}" type="datetimeFigureOut">
               <a:rPr lang="en-GB" smtClean="0"/>
-              <a:t>27/10/2021</a:t>
+              <a:t>10/11/2021</a:t>
             </a:fld>
             <a:endParaRPr lang="en-GB"/>
           </a:p>
@@ -2930,7 +2930,7 @@
           <a:p>
             <a:fld id="{786B9184-6E77-4DA2-9A6A-FCC44F32A373}" type="datetimeFigureOut">
               <a:rPr lang="en-GB" smtClean="0"/>
-              <a:t>27/10/2021</a:t>
+              <a:t>10/11/2021</a:t>
             </a:fld>
             <a:endParaRPr lang="en-GB"/>
           </a:p>
@@ -3421,9 +3421,9 @@
           <p:nvPr/>
         </p:nvCxnSpPr>
         <p:spPr>
-          <a:xfrm>
-            <a:off x="9330" y="4926565"/>
-            <a:ext cx="12192000" cy="0"/>
+          <a:xfrm flipV="1">
+            <a:off x="9330" y="4861279"/>
+            <a:ext cx="10141349" cy="65286"/>
           </a:xfrm>
           <a:prstGeom prst="line">
             <a:avLst/>

</xml_diff>

<commit_message>
New notes and graphic for collaborating with branches
</commit_message>
<xml_diff>
--- a/doc/Figures/temp/tempStateDiagramGH.pptx
+++ b/doc/Figures/temp/tempStateDiagramGH.pptx
@@ -6,6 +6,8 @@
   </p:sldMasterIdLst>
   <p:sldIdLst>
     <p:sldId id="256" r:id="rId2"/>
+    <p:sldId id="257" r:id="rId3"/>
+    <p:sldId id="258" r:id="rId4"/>
   </p:sldIdLst>
   <p:sldSz cx="12192000" cy="6858000"/>
   <p:notesSz cx="6858000" cy="9144000"/>
@@ -261,7 +263,7 @@
           <a:p>
             <a:fld id="{786B9184-6E77-4DA2-9A6A-FCC44F32A373}" type="datetimeFigureOut">
               <a:rPr lang="en-GB" smtClean="0"/>
-              <a:t>10/11/2021</a:t>
+              <a:t>17/11/2021</a:t>
             </a:fld>
             <a:endParaRPr lang="en-GB"/>
           </a:p>
@@ -461,7 +463,7 @@
           <a:p>
             <a:fld id="{786B9184-6E77-4DA2-9A6A-FCC44F32A373}" type="datetimeFigureOut">
               <a:rPr lang="en-GB" smtClean="0"/>
-              <a:t>10/11/2021</a:t>
+              <a:t>17/11/2021</a:t>
             </a:fld>
             <a:endParaRPr lang="en-GB"/>
           </a:p>
@@ -671,7 +673,7 @@
           <a:p>
             <a:fld id="{786B9184-6E77-4DA2-9A6A-FCC44F32A373}" type="datetimeFigureOut">
               <a:rPr lang="en-GB" smtClean="0"/>
-              <a:t>10/11/2021</a:t>
+              <a:t>17/11/2021</a:t>
             </a:fld>
             <a:endParaRPr lang="en-GB"/>
           </a:p>
@@ -871,7 +873,7 @@
           <a:p>
             <a:fld id="{786B9184-6E77-4DA2-9A6A-FCC44F32A373}" type="datetimeFigureOut">
               <a:rPr lang="en-GB" smtClean="0"/>
-              <a:t>10/11/2021</a:t>
+              <a:t>17/11/2021</a:t>
             </a:fld>
             <a:endParaRPr lang="en-GB"/>
           </a:p>
@@ -1147,7 +1149,7 @@
           <a:p>
             <a:fld id="{786B9184-6E77-4DA2-9A6A-FCC44F32A373}" type="datetimeFigureOut">
               <a:rPr lang="en-GB" smtClean="0"/>
-              <a:t>10/11/2021</a:t>
+              <a:t>17/11/2021</a:t>
             </a:fld>
             <a:endParaRPr lang="en-GB"/>
           </a:p>
@@ -1415,7 +1417,7 @@
           <a:p>
             <a:fld id="{786B9184-6E77-4DA2-9A6A-FCC44F32A373}" type="datetimeFigureOut">
               <a:rPr lang="en-GB" smtClean="0"/>
-              <a:t>10/11/2021</a:t>
+              <a:t>17/11/2021</a:t>
             </a:fld>
             <a:endParaRPr lang="en-GB"/>
           </a:p>
@@ -1830,7 +1832,7 @@
           <a:p>
             <a:fld id="{786B9184-6E77-4DA2-9A6A-FCC44F32A373}" type="datetimeFigureOut">
               <a:rPr lang="en-GB" smtClean="0"/>
-              <a:t>10/11/2021</a:t>
+              <a:t>17/11/2021</a:t>
             </a:fld>
             <a:endParaRPr lang="en-GB"/>
           </a:p>
@@ -1972,7 +1974,7 @@
           <a:p>
             <a:fld id="{786B9184-6E77-4DA2-9A6A-FCC44F32A373}" type="datetimeFigureOut">
               <a:rPr lang="en-GB" smtClean="0"/>
-              <a:t>10/11/2021</a:t>
+              <a:t>17/11/2021</a:t>
             </a:fld>
             <a:endParaRPr lang="en-GB"/>
           </a:p>
@@ -2085,7 +2087,7 @@
           <a:p>
             <a:fld id="{786B9184-6E77-4DA2-9A6A-FCC44F32A373}" type="datetimeFigureOut">
               <a:rPr lang="en-GB" smtClean="0"/>
-              <a:t>10/11/2021</a:t>
+              <a:t>17/11/2021</a:t>
             </a:fld>
             <a:endParaRPr lang="en-GB"/>
           </a:p>
@@ -2398,7 +2400,7 @@
           <a:p>
             <a:fld id="{786B9184-6E77-4DA2-9A6A-FCC44F32A373}" type="datetimeFigureOut">
               <a:rPr lang="en-GB" smtClean="0"/>
-              <a:t>10/11/2021</a:t>
+              <a:t>17/11/2021</a:t>
             </a:fld>
             <a:endParaRPr lang="en-GB"/>
           </a:p>
@@ -2687,7 +2689,7 @@
           <a:p>
             <a:fld id="{786B9184-6E77-4DA2-9A6A-FCC44F32A373}" type="datetimeFigureOut">
               <a:rPr lang="en-GB" smtClean="0"/>
-              <a:t>10/11/2021</a:t>
+              <a:t>17/11/2021</a:t>
             </a:fld>
             <a:endParaRPr lang="en-GB"/>
           </a:p>
@@ -2930,7 +2932,7 @@
           <a:p>
             <a:fld id="{786B9184-6E77-4DA2-9A6A-FCC44F32A373}" type="datetimeFigureOut">
               <a:rPr lang="en-GB" smtClean="0"/>
-              <a:t>10/11/2021</a:t>
+              <a:t>17/11/2021</a:t>
             </a:fld>
             <a:endParaRPr lang="en-GB"/>
           </a:p>
@@ -5097,6 +5099,1850 @@
 </p:sld>
 </file>
 
+<file path=ppt/slides/slide2.xml><?xml version="1.0" encoding="utf-8"?>
+<p:sld xmlns:a="http://schemas.openxmlformats.org/drawingml/2006/main" xmlns:r="http://schemas.openxmlformats.org/officeDocument/2006/relationships" xmlns:p="http://schemas.openxmlformats.org/presentationml/2006/main">
+  <p:cSld>
+    <p:spTree>
+      <p:nvGrpSpPr>
+        <p:cNvPr id="1" name=""/>
+        <p:cNvGrpSpPr/>
+        <p:nvPr/>
+      </p:nvGrpSpPr>
+      <p:grpSpPr>
+        <a:xfrm>
+          <a:off x="0" y="0"/>
+          <a:ext cx="0" cy="0"/>
+          <a:chOff x="0" y="0"/>
+          <a:chExt cx="0" cy="0"/>
+        </a:xfrm>
+      </p:grpSpPr>
+      <p:sp>
+        <p:nvSpPr>
+          <p:cNvPr id="10" name="Rectángulo 9">
+            <a:extLst>
+              <a:ext uri="{FF2B5EF4-FFF2-40B4-BE49-F238E27FC236}">
+                <a16:creationId xmlns:a16="http://schemas.microsoft.com/office/drawing/2014/main" id="{119579E0-D158-4F77-94AE-0232247F8A8B}"/>
+              </a:ext>
+            </a:extLst>
+          </p:cNvPr>
+          <p:cNvSpPr/>
+          <p:nvPr/>
+        </p:nvSpPr>
+        <p:spPr>
+          <a:xfrm>
+            <a:off x="1392571" y="604008"/>
+            <a:ext cx="10541282" cy="2634290"/>
+          </a:xfrm>
+          <a:prstGeom prst="rect">
+            <a:avLst/>
+          </a:prstGeom>
+          <a:solidFill>
+            <a:schemeClr val="tx1">
+              <a:lumMod val="65000"/>
+              <a:lumOff val="35000"/>
+              <a:alpha val="50000"/>
+            </a:schemeClr>
+          </a:solidFill>
+          <a:ln>
+            <a:noFill/>
+          </a:ln>
+        </p:spPr>
+        <p:style>
+          <a:lnRef idx="2">
+            <a:schemeClr val="accent1">
+              <a:shade val="50000"/>
+            </a:schemeClr>
+          </a:lnRef>
+          <a:fillRef idx="1">
+            <a:schemeClr val="accent1"/>
+          </a:fillRef>
+          <a:effectRef idx="0">
+            <a:schemeClr val="accent1"/>
+          </a:effectRef>
+          <a:fontRef idx="minor">
+            <a:schemeClr val="lt1"/>
+          </a:fontRef>
+        </p:style>
+        <p:txBody>
+          <a:bodyPr rtlCol="0" anchor="ctr"/>
+          <a:lstStyle/>
+          <a:p>
+            <a:pPr algn="ctr"/>
+            <a:endParaRPr lang="en-US"/>
+          </a:p>
+        </p:txBody>
+      </p:sp>
+      <p:sp>
+        <p:nvSpPr>
+          <p:cNvPr id="11" name="Rectángulo 10">
+            <a:extLst>
+              <a:ext uri="{FF2B5EF4-FFF2-40B4-BE49-F238E27FC236}">
+                <a16:creationId xmlns:a16="http://schemas.microsoft.com/office/drawing/2014/main" id="{9895E96B-0347-41FB-999B-4ED4437414D9}"/>
+              </a:ext>
+            </a:extLst>
+          </p:cNvPr>
+          <p:cNvSpPr/>
+          <p:nvPr/>
+        </p:nvSpPr>
+        <p:spPr>
+          <a:xfrm>
+            <a:off x="1392571" y="3238298"/>
+            <a:ext cx="10541282" cy="2634290"/>
+          </a:xfrm>
+          <a:prstGeom prst="rect">
+            <a:avLst/>
+          </a:prstGeom>
+          <a:solidFill>
+            <a:schemeClr val="accent1">
+              <a:alpha val="50000"/>
+            </a:schemeClr>
+          </a:solidFill>
+          <a:ln>
+            <a:noFill/>
+          </a:ln>
+        </p:spPr>
+        <p:style>
+          <a:lnRef idx="2">
+            <a:schemeClr val="accent1">
+              <a:shade val="50000"/>
+            </a:schemeClr>
+          </a:lnRef>
+          <a:fillRef idx="1">
+            <a:schemeClr val="accent1"/>
+          </a:fillRef>
+          <a:effectRef idx="0">
+            <a:schemeClr val="accent1"/>
+          </a:effectRef>
+          <a:fontRef idx="minor">
+            <a:schemeClr val="lt1"/>
+          </a:fontRef>
+        </p:style>
+        <p:txBody>
+          <a:bodyPr rtlCol="0" anchor="ctr"/>
+          <a:lstStyle/>
+          <a:p>
+            <a:pPr algn="ctr"/>
+            <a:endParaRPr lang="en-US" dirty="0"/>
+          </a:p>
+        </p:txBody>
+      </p:sp>
+      <p:cxnSp>
+        <p:nvCxnSpPr>
+          <p:cNvPr id="2" name="Conector recto de flecha 1">
+            <a:extLst>
+              <a:ext uri="{FF2B5EF4-FFF2-40B4-BE49-F238E27FC236}">
+                <a16:creationId xmlns:a16="http://schemas.microsoft.com/office/drawing/2014/main" id="{55CC1AF4-7FC0-42DF-9794-320442F4BFA5}"/>
+              </a:ext>
+            </a:extLst>
+          </p:cNvPr>
+          <p:cNvCxnSpPr>
+            <a:cxnSpLocks/>
+          </p:cNvCxnSpPr>
+          <p:nvPr/>
+        </p:nvCxnSpPr>
+        <p:spPr>
+          <a:xfrm flipV="1">
+            <a:off x="1392571" y="3232858"/>
+            <a:ext cx="8581853" cy="5440"/>
+          </a:xfrm>
+          <a:prstGeom prst="straightConnector1">
+            <a:avLst/>
+          </a:prstGeom>
+          <a:ln w="63500">
+            <a:solidFill>
+              <a:schemeClr val="tx1"/>
+            </a:solidFill>
+            <a:headEnd type="none"/>
+            <a:tailEnd type="arrow" w="med" len="lg"/>
+          </a:ln>
+        </p:spPr>
+        <p:style>
+          <a:lnRef idx="1">
+            <a:schemeClr val="accent1"/>
+          </a:lnRef>
+          <a:fillRef idx="0">
+            <a:schemeClr val="accent1"/>
+          </a:fillRef>
+          <a:effectRef idx="0">
+            <a:schemeClr val="accent1"/>
+          </a:effectRef>
+          <a:fontRef idx="minor">
+            <a:schemeClr val="tx1"/>
+          </a:fontRef>
+        </p:style>
+      </p:cxnSp>
+      <p:sp>
+        <p:nvSpPr>
+          <p:cNvPr id="5" name="CuadroTexto 4">
+            <a:extLst>
+              <a:ext uri="{FF2B5EF4-FFF2-40B4-BE49-F238E27FC236}">
+                <a16:creationId xmlns:a16="http://schemas.microsoft.com/office/drawing/2014/main" id="{78E68BE9-6066-499F-86AA-6CA10930D7F5}"/>
+              </a:ext>
+            </a:extLst>
+          </p:cNvPr>
+          <p:cNvSpPr txBox="1"/>
+          <p:nvPr/>
+        </p:nvSpPr>
+        <p:spPr>
+          <a:xfrm>
+            <a:off x="1392569" y="2321239"/>
+            <a:ext cx="1710147" cy="584775"/>
+          </a:xfrm>
+          <a:prstGeom prst="rect">
+            <a:avLst/>
+          </a:prstGeom>
+          <a:noFill/>
+        </p:spPr>
+        <p:txBody>
+          <a:bodyPr wrap="none" rtlCol="0">
+            <a:spAutoFit/>
+          </a:bodyPr>
+          <a:lstStyle/>
+          <a:p>
+            <a:pPr algn="ctr"/>
+            <a:r>
+              <a:rPr lang="en-US" sz="1600" b="1" dirty="0"/>
+              <a:t>COLLABORATOR 1</a:t>
+            </a:r>
+          </a:p>
+          <a:p>
+            <a:pPr algn="ctr"/>
+            <a:r>
+              <a:rPr lang="en-US" sz="1600" b="1" dirty="0"/>
+              <a:t>REMOTE</a:t>
+            </a:r>
+          </a:p>
+        </p:txBody>
+      </p:sp>
+      <p:sp>
+        <p:nvSpPr>
+          <p:cNvPr id="9" name="CuadroTexto 8">
+            <a:extLst>
+              <a:ext uri="{FF2B5EF4-FFF2-40B4-BE49-F238E27FC236}">
+                <a16:creationId xmlns:a16="http://schemas.microsoft.com/office/drawing/2014/main" id="{A0516147-A43F-494B-968F-6AFECB012FBC}"/>
+              </a:ext>
+            </a:extLst>
+          </p:cNvPr>
+          <p:cNvSpPr txBox="1"/>
+          <p:nvPr/>
+        </p:nvSpPr>
+        <p:spPr>
+          <a:xfrm>
+            <a:off x="1350294" y="3700348"/>
+            <a:ext cx="1710147" cy="584775"/>
+          </a:xfrm>
+          <a:prstGeom prst="rect">
+            <a:avLst/>
+          </a:prstGeom>
+          <a:noFill/>
+        </p:spPr>
+        <p:txBody>
+          <a:bodyPr wrap="none" rtlCol="0">
+            <a:spAutoFit/>
+          </a:bodyPr>
+          <a:lstStyle/>
+          <a:p>
+            <a:pPr algn="ctr"/>
+            <a:r>
+              <a:rPr lang="en-US" sz="1600" b="1" dirty="0">
+                <a:solidFill>
+                  <a:schemeClr val="accent1">
+                    <a:lumMod val="50000"/>
+                  </a:schemeClr>
+                </a:solidFill>
+              </a:rPr>
+              <a:t>COLLABORATOR 2</a:t>
+            </a:r>
+          </a:p>
+          <a:p>
+            <a:pPr algn="ctr"/>
+            <a:r>
+              <a:rPr lang="en-US" sz="1600" b="1" dirty="0">
+                <a:solidFill>
+                  <a:schemeClr val="accent1">
+                    <a:lumMod val="50000"/>
+                  </a:schemeClr>
+                </a:solidFill>
+              </a:rPr>
+              <a:t>REMOTE</a:t>
+            </a:r>
+          </a:p>
+        </p:txBody>
+      </p:sp>
+      <p:cxnSp>
+        <p:nvCxnSpPr>
+          <p:cNvPr id="19" name="Conector: angular 18">
+            <a:extLst>
+              <a:ext uri="{FF2B5EF4-FFF2-40B4-BE49-F238E27FC236}">
+                <a16:creationId xmlns:a16="http://schemas.microsoft.com/office/drawing/2014/main" id="{AFD1E0CF-EC68-434F-A7FD-89009CCE9FB6}"/>
+              </a:ext>
+            </a:extLst>
+          </p:cNvPr>
+          <p:cNvCxnSpPr>
+            <a:cxnSpLocks/>
+            <a:endCxn id="82" idx="2"/>
+          </p:cNvCxnSpPr>
+          <p:nvPr/>
+        </p:nvCxnSpPr>
+        <p:spPr>
+          <a:xfrm>
+            <a:off x="3517641" y="3232858"/>
+            <a:ext cx="3143393" cy="894503"/>
+          </a:xfrm>
+          <a:prstGeom prst="bentConnector4">
+            <a:avLst>
+              <a:gd name="adj1" fmla="val 3"/>
+              <a:gd name="adj2" fmla="val 201159"/>
+            </a:avLst>
+          </a:prstGeom>
+          <a:ln w="25400">
+            <a:solidFill>
+              <a:schemeClr val="tx1"/>
+            </a:solidFill>
+            <a:tailEnd type="arrow" w="med" len="lg"/>
+          </a:ln>
+        </p:spPr>
+        <p:style>
+          <a:lnRef idx="1">
+            <a:schemeClr val="accent1"/>
+          </a:lnRef>
+          <a:fillRef idx="0">
+            <a:schemeClr val="accent1"/>
+          </a:fillRef>
+          <a:effectRef idx="0">
+            <a:schemeClr val="accent1"/>
+          </a:effectRef>
+          <a:fontRef idx="minor">
+            <a:schemeClr val="tx1"/>
+          </a:fontRef>
+        </p:style>
+      </p:cxnSp>
+      <p:sp>
+        <p:nvSpPr>
+          <p:cNvPr id="28" name="CuadroTexto 27">
+            <a:extLst>
+              <a:ext uri="{FF2B5EF4-FFF2-40B4-BE49-F238E27FC236}">
+                <a16:creationId xmlns:a16="http://schemas.microsoft.com/office/drawing/2014/main" id="{E7D338A0-9D69-4B2A-BC05-293E926B85F1}"/>
+              </a:ext>
+            </a:extLst>
+          </p:cNvPr>
+          <p:cNvSpPr txBox="1"/>
+          <p:nvPr/>
+        </p:nvSpPr>
+        <p:spPr>
+          <a:xfrm>
+            <a:off x="9961092" y="3066301"/>
+            <a:ext cx="1676677" cy="338554"/>
+          </a:xfrm>
+          <a:prstGeom prst="rect">
+            <a:avLst/>
+          </a:prstGeom>
+          <a:noFill/>
+        </p:spPr>
+        <p:txBody>
+          <a:bodyPr wrap="none" rtlCol="0">
+            <a:spAutoFit/>
+          </a:bodyPr>
+          <a:lstStyle/>
+          <a:p>
+            <a:pPr algn="ctr"/>
+            <a:r>
+              <a:rPr lang="en-US" sz="1600" b="1" dirty="0"/>
+              <a:t>MASTER BRANCH</a:t>
+            </a:r>
+          </a:p>
+        </p:txBody>
+      </p:sp>
+      <p:cxnSp>
+        <p:nvCxnSpPr>
+          <p:cNvPr id="63" name="Conector: angular 62">
+            <a:extLst>
+              <a:ext uri="{FF2B5EF4-FFF2-40B4-BE49-F238E27FC236}">
+                <a16:creationId xmlns:a16="http://schemas.microsoft.com/office/drawing/2014/main" id="{1B92616A-C6FC-4707-8E4A-F6E15845C2F3}"/>
+              </a:ext>
+            </a:extLst>
+          </p:cNvPr>
+          <p:cNvCxnSpPr>
+            <a:cxnSpLocks/>
+            <a:endCxn id="90" idx="0"/>
+          </p:cNvCxnSpPr>
+          <p:nvPr/>
+        </p:nvCxnSpPr>
+        <p:spPr>
+          <a:xfrm flipV="1">
+            <a:off x="4349313" y="2305832"/>
+            <a:ext cx="3145571" cy="937906"/>
+          </a:xfrm>
+          <a:prstGeom prst="bentConnector4">
+            <a:avLst>
+              <a:gd name="adj1" fmla="val 340"/>
+              <a:gd name="adj2" fmla="val 191400"/>
+            </a:avLst>
+          </a:prstGeom>
+          <a:ln w="25400">
+            <a:solidFill>
+              <a:schemeClr val="tx1"/>
+            </a:solidFill>
+            <a:tailEnd type="arrow" w="med" len="lg"/>
+          </a:ln>
+        </p:spPr>
+        <p:style>
+          <a:lnRef idx="1">
+            <a:schemeClr val="accent1"/>
+          </a:lnRef>
+          <a:fillRef idx="0">
+            <a:schemeClr val="accent1"/>
+          </a:fillRef>
+          <a:effectRef idx="0">
+            <a:schemeClr val="accent1"/>
+          </a:effectRef>
+          <a:fontRef idx="minor">
+            <a:schemeClr val="tx1"/>
+          </a:fontRef>
+        </p:style>
+      </p:cxnSp>
+      <p:sp>
+        <p:nvSpPr>
+          <p:cNvPr id="67" name="CuadroTexto 66">
+            <a:extLst>
+              <a:ext uri="{FF2B5EF4-FFF2-40B4-BE49-F238E27FC236}">
+                <a16:creationId xmlns:a16="http://schemas.microsoft.com/office/drawing/2014/main" id="{DD5AF870-9674-447A-A164-4F1782F517BA}"/>
+              </a:ext>
+            </a:extLst>
+          </p:cNvPr>
+          <p:cNvSpPr txBox="1"/>
+          <p:nvPr/>
+        </p:nvSpPr>
+        <p:spPr>
+          <a:xfrm>
+            <a:off x="3517641" y="4741101"/>
+            <a:ext cx="1073692" cy="276999"/>
+          </a:xfrm>
+          <a:prstGeom prst="rect">
+            <a:avLst/>
+          </a:prstGeom>
+          <a:noFill/>
+        </p:spPr>
+        <p:txBody>
+          <a:bodyPr wrap="none" rtlCol="0">
+            <a:spAutoFit/>
+          </a:bodyPr>
+          <a:lstStyle/>
+          <a:p>
+            <a:pPr algn="ctr"/>
+            <a:r>
+              <a:rPr lang="en-US" sz="1200" b="1" dirty="0" err="1">
+                <a:solidFill>
+                  <a:schemeClr val="accent1">
+                    <a:lumMod val="50000"/>
+                  </a:schemeClr>
+                </a:solidFill>
+              </a:rPr>
+              <a:t>TaskA_Branch</a:t>
+            </a:r>
+            <a:endParaRPr lang="en-US" sz="1200" b="1" dirty="0">
+              <a:solidFill>
+                <a:schemeClr val="accent1">
+                  <a:lumMod val="50000"/>
+                </a:schemeClr>
+              </a:solidFill>
+            </a:endParaRPr>
+          </a:p>
+        </p:txBody>
+      </p:sp>
+      <p:sp>
+        <p:nvSpPr>
+          <p:cNvPr id="68" name="CuadroTexto 67">
+            <a:extLst>
+              <a:ext uri="{FF2B5EF4-FFF2-40B4-BE49-F238E27FC236}">
+                <a16:creationId xmlns:a16="http://schemas.microsoft.com/office/drawing/2014/main" id="{B88D6941-CA3F-433C-B3F0-5060152C7397}"/>
+              </a:ext>
+            </a:extLst>
+          </p:cNvPr>
+          <p:cNvSpPr txBox="1"/>
+          <p:nvPr/>
+        </p:nvSpPr>
+        <p:spPr>
+          <a:xfrm>
+            <a:off x="4247058" y="1195542"/>
+            <a:ext cx="1067280" cy="276999"/>
+          </a:xfrm>
+          <a:prstGeom prst="rect">
+            <a:avLst/>
+          </a:prstGeom>
+          <a:noFill/>
+        </p:spPr>
+        <p:txBody>
+          <a:bodyPr wrap="none" rtlCol="0">
+            <a:spAutoFit/>
+          </a:bodyPr>
+          <a:lstStyle/>
+          <a:p>
+            <a:pPr algn="ctr"/>
+            <a:r>
+              <a:rPr lang="en-US" sz="1200" b="1" dirty="0" err="1"/>
+              <a:t>TaskB_Branch</a:t>
+            </a:r>
+            <a:endParaRPr lang="en-US" sz="1200" b="1" dirty="0"/>
+          </a:p>
+        </p:txBody>
+      </p:sp>
+      <p:sp>
+        <p:nvSpPr>
+          <p:cNvPr id="75" name="CuadroTexto 74">
+            <a:extLst>
+              <a:ext uri="{FF2B5EF4-FFF2-40B4-BE49-F238E27FC236}">
+                <a16:creationId xmlns:a16="http://schemas.microsoft.com/office/drawing/2014/main" id="{74FFC284-674C-4257-9B5D-4DDBCF462D0A}"/>
+              </a:ext>
+            </a:extLst>
+          </p:cNvPr>
+          <p:cNvSpPr txBox="1"/>
+          <p:nvPr/>
+        </p:nvSpPr>
+        <p:spPr>
+          <a:xfrm>
+            <a:off x="7513762" y="2758567"/>
+            <a:ext cx="1341521" cy="461665"/>
+          </a:xfrm>
+          <a:prstGeom prst="rect">
+            <a:avLst/>
+          </a:prstGeom>
+          <a:noFill/>
+        </p:spPr>
+        <p:txBody>
+          <a:bodyPr wrap="none" rtlCol="0">
+            <a:spAutoFit/>
+          </a:bodyPr>
+          <a:lstStyle/>
+          <a:p>
+            <a:r>
+              <a:rPr lang="en-US" sz="1200" b="1" dirty="0"/>
+              <a:t>MERGE Branch</a:t>
+            </a:r>
+          </a:p>
+          <a:p>
+            <a:r>
+              <a:rPr lang="en-US" sz="1200" b="1" dirty="0"/>
+              <a:t>Conflicts to solve?</a:t>
+            </a:r>
+          </a:p>
+        </p:txBody>
+      </p:sp>
+      <p:sp>
+        <p:nvSpPr>
+          <p:cNvPr id="76" name="CuadroTexto 75">
+            <a:extLst>
+              <a:ext uri="{FF2B5EF4-FFF2-40B4-BE49-F238E27FC236}">
+                <a16:creationId xmlns:a16="http://schemas.microsoft.com/office/drawing/2014/main" id="{80607030-97D4-452E-982F-AD893FD39CCF}"/>
+              </a:ext>
+            </a:extLst>
+          </p:cNvPr>
+          <p:cNvSpPr txBox="1"/>
+          <p:nvPr/>
+        </p:nvSpPr>
+        <p:spPr>
+          <a:xfrm>
+            <a:off x="5596788" y="2912134"/>
+            <a:ext cx="1132233" cy="276999"/>
+          </a:xfrm>
+          <a:prstGeom prst="rect">
+            <a:avLst/>
+          </a:prstGeom>
+          <a:noFill/>
+        </p:spPr>
+        <p:txBody>
+          <a:bodyPr wrap="none" rtlCol="0">
+            <a:spAutoFit/>
+          </a:bodyPr>
+          <a:lstStyle/>
+          <a:p>
+            <a:r>
+              <a:rPr lang="en-US" sz="1200" b="1" dirty="0">
+                <a:solidFill>
+                  <a:schemeClr val="accent1">
+                    <a:lumMod val="50000"/>
+                  </a:schemeClr>
+                </a:solidFill>
+              </a:rPr>
+              <a:t>MERGE Branch</a:t>
+            </a:r>
+          </a:p>
+        </p:txBody>
+      </p:sp>
+      <p:sp>
+        <p:nvSpPr>
+          <p:cNvPr id="77" name="Rectángulo 76">
+            <a:extLst>
+              <a:ext uri="{FF2B5EF4-FFF2-40B4-BE49-F238E27FC236}">
+                <a16:creationId xmlns:a16="http://schemas.microsoft.com/office/drawing/2014/main" id="{B6BA923C-7215-4448-B752-D6AA62855A0B}"/>
+              </a:ext>
+            </a:extLst>
+          </p:cNvPr>
+          <p:cNvSpPr/>
+          <p:nvPr/>
+        </p:nvSpPr>
+        <p:spPr>
+          <a:xfrm>
+            <a:off x="1392571" y="614034"/>
+            <a:ext cx="10541282" cy="5258554"/>
+          </a:xfrm>
+          <a:prstGeom prst="rect">
+            <a:avLst/>
+          </a:prstGeom>
+          <a:noFill/>
+          <a:ln w="25400">
+            <a:solidFill>
+              <a:schemeClr val="tx1"/>
+            </a:solidFill>
+          </a:ln>
+        </p:spPr>
+        <p:style>
+          <a:lnRef idx="2">
+            <a:schemeClr val="accent1">
+              <a:shade val="50000"/>
+            </a:schemeClr>
+          </a:lnRef>
+          <a:fillRef idx="1">
+            <a:schemeClr val="accent1"/>
+          </a:fillRef>
+          <a:effectRef idx="0">
+            <a:schemeClr val="accent1"/>
+          </a:effectRef>
+          <a:fontRef idx="minor">
+            <a:schemeClr val="lt1"/>
+          </a:fontRef>
+        </p:style>
+        <p:txBody>
+          <a:bodyPr rtlCol="0" anchor="ctr"/>
+          <a:lstStyle/>
+          <a:p>
+            <a:pPr algn="ctr"/>
+            <a:endParaRPr lang="en-US"/>
+          </a:p>
+        </p:txBody>
+      </p:sp>
+      <p:sp>
+        <p:nvSpPr>
+          <p:cNvPr id="79" name="CuadroTexto 78">
+            <a:extLst>
+              <a:ext uri="{FF2B5EF4-FFF2-40B4-BE49-F238E27FC236}">
+                <a16:creationId xmlns:a16="http://schemas.microsoft.com/office/drawing/2014/main" id="{F2560132-7B31-4CE1-AFAD-6F45DDB5E966}"/>
+              </a:ext>
+            </a:extLst>
+          </p:cNvPr>
+          <p:cNvSpPr txBox="1"/>
+          <p:nvPr/>
+        </p:nvSpPr>
+        <p:spPr>
+          <a:xfrm>
+            <a:off x="1390135" y="4921628"/>
+            <a:ext cx="1710147" cy="584775"/>
+          </a:xfrm>
+          <a:prstGeom prst="rect">
+            <a:avLst/>
+          </a:prstGeom>
+          <a:noFill/>
+        </p:spPr>
+        <p:txBody>
+          <a:bodyPr wrap="none" rtlCol="0">
+            <a:spAutoFit/>
+          </a:bodyPr>
+          <a:lstStyle/>
+          <a:p>
+            <a:pPr algn="ctr"/>
+            <a:r>
+              <a:rPr lang="en-US" sz="1600" b="1" dirty="0">
+                <a:solidFill>
+                  <a:schemeClr val="accent1">
+                    <a:lumMod val="50000"/>
+                  </a:schemeClr>
+                </a:solidFill>
+              </a:rPr>
+              <a:t>COLLABORATOR 2</a:t>
+            </a:r>
+          </a:p>
+          <a:p>
+            <a:pPr algn="ctr"/>
+            <a:r>
+              <a:rPr lang="en-US" sz="1600" b="1" dirty="0">
+                <a:solidFill>
+                  <a:schemeClr val="accent1">
+                    <a:lumMod val="50000"/>
+                  </a:schemeClr>
+                </a:solidFill>
+              </a:rPr>
+              <a:t>LOCAL</a:t>
+            </a:r>
+          </a:p>
+        </p:txBody>
+      </p:sp>
+      <p:sp>
+        <p:nvSpPr>
+          <p:cNvPr id="80" name="CuadroTexto 79">
+            <a:extLst>
+              <a:ext uri="{FF2B5EF4-FFF2-40B4-BE49-F238E27FC236}">
+                <a16:creationId xmlns:a16="http://schemas.microsoft.com/office/drawing/2014/main" id="{E011076B-DD6C-45D0-AAE5-064F3E68A8AF}"/>
+              </a:ext>
+            </a:extLst>
+          </p:cNvPr>
+          <p:cNvSpPr txBox="1"/>
+          <p:nvPr/>
+        </p:nvSpPr>
+        <p:spPr>
+          <a:xfrm>
+            <a:off x="1390135" y="1041653"/>
+            <a:ext cx="1710147" cy="584775"/>
+          </a:xfrm>
+          <a:prstGeom prst="rect">
+            <a:avLst/>
+          </a:prstGeom>
+          <a:noFill/>
+        </p:spPr>
+        <p:txBody>
+          <a:bodyPr wrap="none" rtlCol="0">
+            <a:spAutoFit/>
+          </a:bodyPr>
+          <a:lstStyle/>
+          <a:p>
+            <a:pPr algn="ctr"/>
+            <a:r>
+              <a:rPr lang="en-US" sz="1600" b="1" dirty="0"/>
+              <a:t>COLLABORATOR 1</a:t>
+            </a:r>
+          </a:p>
+          <a:p>
+            <a:pPr algn="ctr"/>
+            <a:r>
+              <a:rPr lang="en-US" sz="1600" b="1" dirty="0"/>
+              <a:t>LOCAL</a:t>
+            </a:r>
+          </a:p>
+        </p:txBody>
+      </p:sp>
+      <p:sp>
+        <p:nvSpPr>
+          <p:cNvPr id="82" name="Rectángulo 81">
+            <a:extLst>
+              <a:ext uri="{FF2B5EF4-FFF2-40B4-BE49-F238E27FC236}">
+                <a16:creationId xmlns:a16="http://schemas.microsoft.com/office/drawing/2014/main" id="{CDCE2A34-3BA5-4B16-B8EB-C4F6930EA1D2}"/>
+              </a:ext>
+            </a:extLst>
+          </p:cNvPr>
+          <p:cNvSpPr/>
+          <p:nvPr/>
+        </p:nvSpPr>
+        <p:spPr>
+          <a:xfrm>
+            <a:off x="6203834" y="3212961"/>
+            <a:ext cx="914400" cy="914400"/>
+          </a:xfrm>
+          <a:prstGeom prst="rect">
+            <a:avLst/>
+          </a:prstGeom>
+          <a:noFill/>
+          <a:ln>
+            <a:noFill/>
+          </a:ln>
+        </p:spPr>
+        <p:style>
+          <a:lnRef idx="2">
+            <a:schemeClr val="accent1">
+              <a:shade val="50000"/>
+            </a:schemeClr>
+          </a:lnRef>
+          <a:fillRef idx="1">
+            <a:schemeClr val="accent1"/>
+          </a:fillRef>
+          <a:effectRef idx="0">
+            <a:schemeClr val="accent1"/>
+          </a:effectRef>
+          <a:fontRef idx="minor">
+            <a:schemeClr val="lt1"/>
+          </a:fontRef>
+        </p:style>
+        <p:txBody>
+          <a:bodyPr rtlCol="0" anchor="ctr"/>
+          <a:lstStyle/>
+          <a:p>
+            <a:pPr algn="ctr"/>
+            <a:endParaRPr lang="en-US"/>
+          </a:p>
+        </p:txBody>
+      </p:sp>
+      <p:cxnSp>
+        <p:nvCxnSpPr>
+          <p:cNvPr id="86" name="Conector: angular 85">
+            <a:extLst>
+              <a:ext uri="{FF2B5EF4-FFF2-40B4-BE49-F238E27FC236}">
+                <a16:creationId xmlns:a16="http://schemas.microsoft.com/office/drawing/2014/main" id="{D8C190D0-6B3D-4DC3-868A-1FCCC55B5BCA}"/>
+              </a:ext>
+            </a:extLst>
+          </p:cNvPr>
+          <p:cNvCxnSpPr>
+            <a:cxnSpLocks/>
+            <a:stCxn id="82" idx="2"/>
+            <a:endCxn id="11" idx="0"/>
+          </p:cNvCxnSpPr>
+          <p:nvPr/>
+        </p:nvCxnSpPr>
+        <p:spPr>
+          <a:xfrm flipV="1">
+            <a:off x="6661034" y="3238298"/>
+            <a:ext cx="2178" cy="889063"/>
+          </a:xfrm>
+          <a:prstGeom prst="straightConnector1">
+            <a:avLst/>
+          </a:prstGeom>
+          <a:ln w="25400">
+            <a:solidFill>
+              <a:schemeClr val="tx1"/>
+            </a:solidFill>
+            <a:tailEnd type="arrow" w="med" len="lg"/>
+          </a:ln>
+        </p:spPr>
+        <p:style>
+          <a:lnRef idx="1">
+            <a:schemeClr val="accent1"/>
+          </a:lnRef>
+          <a:fillRef idx="0">
+            <a:schemeClr val="accent1"/>
+          </a:fillRef>
+          <a:effectRef idx="0">
+            <a:schemeClr val="accent1"/>
+          </a:effectRef>
+          <a:fontRef idx="minor">
+            <a:schemeClr val="tx1"/>
+          </a:fontRef>
+        </p:style>
+      </p:cxnSp>
+      <p:sp>
+        <p:nvSpPr>
+          <p:cNvPr id="89" name="CuadroTexto 88">
+            <a:extLst>
+              <a:ext uri="{FF2B5EF4-FFF2-40B4-BE49-F238E27FC236}">
+                <a16:creationId xmlns:a16="http://schemas.microsoft.com/office/drawing/2014/main" id="{868C342D-C233-44BD-8ABC-51658779AD68}"/>
+              </a:ext>
+            </a:extLst>
+          </p:cNvPr>
+          <p:cNvSpPr txBox="1"/>
+          <p:nvPr/>
+        </p:nvSpPr>
+        <p:spPr>
+          <a:xfrm>
+            <a:off x="5570439" y="4064402"/>
+            <a:ext cx="1051122" cy="276999"/>
+          </a:xfrm>
+          <a:prstGeom prst="rect">
+            <a:avLst/>
+          </a:prstGeom>
+          <a:noFill/>
+        </p:spPr>
+        <p:txBody>
+          <a:bodyPr wrap="none" rtlCol="0">
+            <a:spAutoFit/>
+          </a:bodyPr>
+          <a:lstStyle/>
+          <a:p>
+            <a:r>
+              <a:rPr lang="en-US" sz="1200" b="1" dirty="0">
+                <a:solidFill>
+                  <a:schemeClr val="accent1">
+                    <a:lumMod val="50000"/>
+                  </a:schemeClr>
+                </a:solidFill>
+              </a:rPr>
+              <a:t>PULL Request</a:t>
+            </a:r>
+          </a:p>
+        </p:txBody>
+      </p:sp>
+      <p:sp>
+        <p:nvSpPr>
+          <p:cNvPr id="90" name="Rectángulo 89">
+            <a:extLst>
+              <a:ext uri="{FF2B5EF4-FFF2-40B4-BE49-F238E27FC236}">
+                <a16:creationId xmlns:a16="http://schemas.microsoft.com/office/drawing/2014/main" id="{4B7FFECA-BEA9-4149-8ABB-C7920C619ED9}"/>
+              </a:ext>
+            </a:extLst>
+          </p:cNvPr>
+          <p:cNvSpPr/>
+          <p:nvPr/>
+        </p:nvSpPr>
+        <p:spPr>
+          <a:xfrm>
+            <a:off x="7037684" y="2305832"/>
+            <a:ext cx="914400" cy="914400"/>
+          </a:xfrm>
+          <a:prstGeom prst="rect">
+            <a:avLst/>
+          </a:prstGeom>
+          <a:noFill/>
+          <a:ln>
+            <a:noFill/>
+          </a:ln>
+        </p:spPr>
+        <p:style>
+          <a:lnRef idx="2">
+            <a:schemeClr val="accent1">
+              <a:shade val="50000"/>
+            </a:schemeClr>
+          </a:lnRef>
+          <a:fillRef idx="1">
+            <a:schemeClr val="accent1"/>
+          </a:fillRef>
+          <a:effectRef idx="0">
+            <a:schemeClr val="accent1"/>
+          </a:effectRef>
+          <a:fontRef idx="minor">
+            <a:schemeClr val="lt1"/>
+          </a:fontRef>
+        </p:style>
+        <p:txBody>
+          <a:bodyPr rtlCol="0" anchor="ctr"/>
+          <a:lstStyle/>
+          <a:p>
+            <a:pPr algn="ctr"/>
+            <a:endParaRPr lang="en-US"/>
+          </a:p>
+        </p:txBody>
+      </p:sp>
+      <p:cxnSp>
+        <p:nvCxnSpPr>
+          <p:cNvPr id="97" name="Conector: angular 85">
+            <a:extLst>
+              <a:ext uri="{FF2B5EF4-FFF2-40B4-BE49-F238E27FC236}">
+                <a16:creationId xmlns:a16="http://schemas.microsoft.com/office/drawing/2014/main" id="{8005C341-7927-4EF5-BF6C-154AF4DB0F82}"/>
+              </a:ext>
+            </a:extLst>
+          </p:cNvPr>
+          <p:cNvCxnSpPr>
+            <a:cxnSpLocks/>
+            <a:stCxn id="90" idx="0"/>
+            <a:endCxn id="90" idx="2"/>
+          </p:cNvCxnSpPr>
+          <p:nvPr/>
+        </p:nvCxnSpPr>
+        <p:spPr>
+          <a:xfrm>
+            <a:off x="7494884" y="2305832"/>
+            <a:ext cx="0" cy="914400"/>
+          </a:xfrm>
+          <a:prstGeom prst="straightConnector1">
+            <a:avLst/>
+          </a:prstGeom>
+          <a:ln w="25400">
+            <a:solidFill>
+              <a:schemeClr val="tx1"/>
+            </a:solidFill>
+            <a:tailEnd type="arrow" w="med" len="lg"/>
+          </a:ln>
+        </p:spPr>
+        <p:style>
+          <a:lnRef idx="1">
+            <a:schemeClr val="accent1"/>
+          </a:lnRef>
+          <a:fillRef idx="0">
+            <a:schemeClr val="accent1"/>
+          </a:fillRef>
+          <a:effectRef idx="0">
+            <a:schemeClr val="accent1"/>
+          </a:effectRef>
+          <a:fontRef idx="minor">
+            <a:schemeClr val="tx1"/>
+          </a:fontRef>
+        </p:style>
+      </p:cxnSp>
+      <p:sp>
+        <p:nvSpPr>
+          <p:cNvPr id="100" name="CuadroTexto 99">
+            <a:extLst>
+              <a:ext uri="{FF2B5EF4-FFF2-40B4-BE49-F238E27FC236}">
+                <a16:creationId xmlns:a16="http://schemas.microsoft.com/office/drawing/2014/main" id="{A2B40A4D-46EA-4A0F-B47F-AF0A9FE8F2EF}"/>
+              </a:ext>
+            </a:extLst>
+          </p:cNvPr>
+          <p:cNvSpPr txBox="1"/>
+          <p:nvPr/>
+        </p:nvSpPr>
+        <p:spPr>
+          <a:xfrm>
+            <a:off x="7517549" y="2026113"/>
+            <a:ext cx="1051122" cy="276999"/>
+          </a:xfrm>
+          <a:prstGeom prst="rect">
+            <a:avLst/>
+          </a:prstGeom>
+          <a:noFill/>
+        </p:spPr>
+        <p:txBody>
+          <a:bodyPr wrap="none" rtlCol="0">
+            <a:spAutoFit/>
+          </a:bodyPr>
+          <a:lstStyle/>
+          <a:p>
+            <a:r>
+              <a:rPr lang="en-US" sz="1200" b="1" dirty="0"/>
+              <a:t>PULL Request</a:t>
+            </a:r>
+          </a:p>
+        </p:txBody>
+      </p:sp>
+      <p:cxnSp>
+        <p:nvCxnSpPr>
+          <p:cNvPr id="101" name="Conector recto 100">
+            <a:extLst>
+              <a:ext uri="{FF2B5EF4-FFF2-40B4-BE49-F238E27FC236}">
+                <a16:creationId xmlns:a16="http://schemas.microsoft.com/office/drawing/2014/main" id="{05F2E648-1E94-44BE-B459-10438912BD9D}"/>
+              </a:ext>
+            </a:extLst>
+          </p:cNvPr>
+          <p:cNvCxnSpPr>
+            <a:cxnSpLocks/>
+            <a:stCxn id="10" idx="1"/>
+            <a:endCxn id="10" idx="3"/>
+          </p:cNvCxnSpPr>
+          <p:nvPr/>
+        </p:nvCxnSpPr>
+        <p:spPr>
+          <a:xfrm>
+            <a:off x="1392571" y="1921153"/>
+            <a:ext cx="10541282" cy="0"/>
+          </a:xfrm>
+          <a:prstGeom prst="line">
+            <a:avLst/>
+          </a:prstGeom>
+          <a:ln w="31750">
+            <a:solidFill>
+              <a:schemeClr val="tx1"/>
+            </a:solidFill>
+            <a:prstDash val="dash"/>
+          </a:ln>
+        </p:spPr>
+        <p:style>
+          <a:lnRef idx="1">
+            <a:schemeClr val="accent1"/>
+          </a:lnRef>
+          <a:fillRef idx="0">
+            <a:schemeClr val="accent1"/>
+          </a:fillRef>
+          <a:effectRef idx="0">
+            <a:schemeClr val="accent1"/>
+          </a:effectRef>
+          <a:fontRef idx="minor">
+            <a:schemeClr val="tx1"/>
+          </a:fontRef>
+        </p:style>
+      </p:cxnSp>
+      <p:cxnSp>
+        <p:nvCxnSpPr>
+          <p:cNvPr id="105" name="Conector recto 104">
+            <a:extLst>
+              <a:ext uri="{FF2B5EF4-FFF2-40B4-BE49-F238E27FC236}">
+                <a16:creationId xmlns:a16="http://schemas.microsoft.com/office/drawing/2014/main" id="{B019CD6C-E857-414A-BCB7-968FC0B619DA}"/>
+              </a:ext>
+            </a:extLst>
+          </p:cNvPr>
+          <p:cNvCxnSpPr>
+            <a:cxnSpLocks/>
+            <a:stCxn id="11" idx="1"/>
+            <a:endCxn id="11" idx="3"/>
+          </p:cNvCxnSpPr>
+          <p:nvPr/>
+        </p:nvCxnSpPr>
+        <p:spPr>
+          <a:xfrm>
+            <a:off x="1392571" y="4555443"/>
+            <a:ext cx="10541282" cy="0"/>
+          </a:xfrm>
+          <a:prstGeom prst="line">
+            <a:avLst/>
+          </a:prstGeom>
+          <a:ln w="31750">
+            <a:solidFill>
+              <a:schemeClr val="accent1">
+                <a:lumMod val="50000"/>
+              </a:schemeClr>
+            </a:solidFill>
+            <a:prstDash val="dash"/>
+          </a:ln>
+        </p:spPr>
+        <p:style>
+          <a:lnRef idx="1">
+            <a:schemeClr val="accent1"/>
+          </a:lnRef>
+          <a:fillRef idx="0">
+            <a:schemeClr val="accent1"/>
+          </a:fillRef>
+          <a:effectRef idx="0">
+            <a:schemeClr val="accent1"/>
+          </a:effectRef>
+          <a:fontRef idx="minor">
+            <a:schemeClr val="tx1"/>
+          </a:fontRef>
+        </p:style>
+      </p:cxnSp>
+      <p:sp>
+        <p:nvSpPr>
+          <p:cNvPr id="108" name="CuadroTexto 107">
+            <a:extLst>
+              <a:ext uri="{FF2B5EF4-FFF2-40B4-BE49-F238E27FC236}">
+                <a16:creationId xmlns:a16="http://schemas.microsoft.com/office/drawing/2014/main" id="{A8AE0DA7-DFD0-42F2-A63F-DE2B3010F0AC}"/>
+              </a:ext>
+            </a:extLst>
+          </p:cNvPr>
+          <p:cNvSpPr txBox="1"/>
+          <p:nvPr/>
+        </p:nvSpPr>
+        <p:spPr>
+          <a:xfrm>
+            <a:off x="5485753" y="5061036"/>
+            <a:ext cx="1436162" cy="461665"/>
+          </a:xfrm>
+          <a:prstGeom prst="rect">
+            <a:avLst/>
+          </a:prstGeom>
+          <a:noFill/>
+        </p:spPr>
+        <p:txBody>
+          <a:bodyPr wrap="none" rtlCol="0">
+            <a:spAutoFit/>
+          </a:bodyPr>
+          <a:lstStyle/>
+          <a:p>
+            <a:pPr algn="ctr"/>
+            <a:r>
+              <a:rPr lang="en-US" sz="1200" b="1" dirty="0" err="1">
+                <a:solidFill>
+                  <a:schemeClr val="accent1">
+                    <a:lumMod val="50000"/>
+                  </a:schemeClr>
+                </a:solidFill>
+              </a:rPr>
+              <a:t>TaskA</a:t>
+            </a:r>
+            <a:r>
+              <a:rPr lang="en-US" sz="1200" b="1" dirty="0">
+                <a:solidFill>
+                  <a:schemeClr val="accent1">
+                    <a:lumMod val="50000"/>
+                  </a:schemeClr>
+                </a:solidFill>
+              </a:rPr>
+              <a:t> Finished and </a:t>
+            </a:r>
+          </a:p>
+          <a:p>
+            <a:pPr algn="ctr"/>
+            <a:r>
+              <a:rPr lang="en-US" sz="1200" b="1" dirty="0">
+                <a:solidFill>
+                  <a:schemeClr val="accent1">
+                    <a:lumMod val="50000"/>
+                  </a:schemeClr>
+                </a:solidFill>
+              </a:rPr>
+              <a:t>working properly</a:t>
+            </a:r>
+          </a:p>
+        </p:txBody>
+      </p:sp>
+      <p:sp>
+        <p:nvSpPr>
+          <p:cNvPr id="109" name="CuadroTexto 108">
+            <a:extLst>
+              <a:ext uri="{FF2B5EF4-FFF2-40B4-BE49-F238E27FC236}">
+                <a16:creationId xmlns:a16="http://schemas.microsoft.com/office/drawing/2014/main" id="{7D3C2D0D-A1B7-40F9-A1E5-05E64EFAAC9C}"/>
+              </a:ext>
+            </a:extLst>
+          </p:cNvPr>
+          <p:cNvSpPr txBox="1"/>
+          <p:nvPr/>
+        </p:nvSpPr>
+        <p:spPr>
+          <a:xfrm>
+            <a:off x="6636435" y="954762"/>
+            <a:ext cx="1429750" cy="461665"/>
+          </a:xfrm>
+          <a:prstGeom prst="rect">
+            <a:avLst/>
+          </a:prstGeom>
+          <a:noFill/>
+        </p:spPr>
+        <p:txBody>
+          <a:bodyPr wrap="none" rtlCol="0">
+            <a:spAutoFit/>
+          </a:bodyPr>
+          <a:lstStyle/>
+          <a:p>
+            <a:pPr algn="ctr"/>
+            <a:r>
+              <a:rPr lang="en-US" sz="1200" b="1" dirty="0" err="1"/>
+              <a:t>TaskB</a:t>
+            </a:r>
+            <a:r>
+              <a:rPr lang="en-US" sz="1200" b="1" dirty="0"/>
+              <a:t> Finished and </a:t>
+            </a:r>
+          </a:p>
+          <a:p>
+            <a:pPr algn="ctr"/>
+            <a:r>
+              <a:rPr lang="en-US" sz="1200" b="1" dirty="0"/>
+              <a:t>working properly</a:t>
+            </a:r>
+          </a:p>
+        </p:txBody>
+      </p:sp>
+      <p:sp>
+        <p:nvSpPr>
+          <p:cNvPr id="120" name="Rectángulo 119">
+            <a:extLst>
+              <a:ext uri="{FF2B5EF4-FFF2-40B4-BE49-F238E27FC236}">
+                <a16:creationId xmlns:a16="http://schemas.microsoft.com/office/drawing/2014/main" id="{87A56CD0-E7BA-4E92-9A6E-DD859C36A43F}"/>
+              </a:ext>
+            </a:extLst>
+          </p:cNvPr>
+          <p:cNvSpPr/>
+          <p:nvPr/>
+        </p:nvSpPr>
+        <p:spPr>
+          <a:xfrm>
+            <a:off x="8227314" y="4546163"/>
+            <a:ext cx="1080071" cy="960239"/>
+          </a:xfrm>
+          <a:prstGeom prst="rect">
+            <a:avLst/>
+          </a:prstGeom>
+          <a:noFill/>
+          <a:ln>
+            <a:noFill/>
+          </a:ln>
+        </p:spPr>
+        <p:style>
+          <a:lnRef idx="2">
+            <a:schemeClr val="accent1">
+              <a:shade val="50000"/>
+            </a:schemeClr>
+          </a:lnRef>
+          <a:fillRef idx="1">
+            <a:schemeClr val="accent1"/>
+          </a:fillRef>
+          <a:effectRef idx="0">
+            <a:schemeClr val="accent1"/>
+          </a:effectRef>
+          <a:fontRef idx="minor">
+            <a:schemeClr val="lt1"/>
+          </a:fontRef>
+        </p:style>
+        <p:txBody>
+          <a:bodyPr rtlCol="0" anchor="ctr"/>
+          <a:lstStyle/>
+          <a:p>
+            <a:pPr algn="ctr"/>
+            <a:r>
+              <a:rPr lang="en-US" sz="2000" dirty="0">
+                <a:solidFill>
+                  <a:schemeClr val="tx1"/>
+                </a:solidFill>
+              </a:rPr>
+              <a:t>● ● ●</a:t>
+            </a:r>
+          </a:p>
+        </p:txBody>
+      </p:sp>
+      <p:cxnSp>
+        <p:nvCxnSpPr>
+          <p:cNvPr id="121" name="Conector: angular 120">
+            <a:extLst>
+              <a:ext uri="{FF2B5EF4-FFF2-40B4-BE49-F238E27FC236}">
+                <a16:creationId xmlns:a16="http://schemas.microsoft.com/office/drawing/2014/main" id="{FE4D5DE0-458C-415B-9721-646A9D63DDA9}"/>
+              </a:ext>
+            </a:extLst>
+          </p:cNvPr>
+          <p:cNvCxnSpPr>
+            <a:cxnSpLocks/>
+            <a:endCxn id="120" idx="1"/>
+          </p:cNvCxnSpPr>
+          <p:nvPr/>
+        </p:nvCxnSpPr>
+        <p:spPr>
+          <a:xfrm rot="16200000" flipH="1">
+            <a:off x="6693794" y="3492763"/>
+            <a:ext cx="1783582" cy="1283458"/>
+          </a:xfrm>
+          <a:prstGeom prst="bentConnector2">
+            <a:avLst/>
+          </a:prstGeom>
+          <a:ln w="25400">
+            <a:solidFill>
+              <a:schemeClr val="tx1"/>
+            </a:solidFill>
+            <a:tailEnd type="arrow" w="med" len="lg"/>
+          </a:ln>
+        </p:spPr>
+        <p:style>
+          <a:lnRef idx="1">
+            <a:schemeClr val="accent1"/>
+          </a:lnRef>
+          <a:fillRef idx="0">
+            <a:schemeClr val="accent1"/>
+          </a:fillRef>
+          <a:effectRef idx="0">
+            <a:schemeClr val="accent1"/>
+          </a:effectRef>
+          <a:fontRef idx="minor">
+            <a:schemeClr val="tx1"/>
+          </a:fontRef>
+        </p:style>
+      </p:cxnSp>
+      <p:sp>
+        <p:nvSpPr>
+          <p:cNvPr id="125" name="CuadroTexto 124">
+            <a:extLst>
+              <a:ext uri="{FF2B5EF4-FFF2-40B4-BE49-F238E27FC236}">
+                <a16:creationId xmlns:a16="http://schemas.microsoft.com/office/drawing/2014/main" id="{79D55EC3-B733-46CC-A6BC-A4D141BB0F4F}"/>
+              </a:ext>
+            </a:extLst>
+          </p:cNvPr>
+          <p:cNvSpPr txBox="1"/>
+          <p:nvPr/>
+        </p:nvSpPr>
+        <p:spPr>
+          <a:xfrm>
+            <a:off x="8010057" y="3862515"/>
+            <a:ext cx="1881707" cy="461665"/>
+          </a:xfrm>
+          <a:prstGeom prst="rect">
+            <a:avLst/>
+          </a:prstGeom>
+          <a:noFill/>
+          <a:ln w="25400">
+            <a:solidFill>
+              <a:srgbClr val="FF0000"/>
+            </a:solidFill>
+          </a:ln>
+        </p:spPr>
+        <p:txBody>
+          <a:bodyPr wrap="square" rtlCol="0">
+            <a:spAutoFit/>
+          </a:bodyPr>
+          <a:lstStyle/>
+          <a:p>
+            <a:r>
+              <a:rPr lang="en-US" sz="1200" b="1" dirty="0">
+                <a:solidFill>
+                  <a:srgbClr val="FF0000"/>
+                </a:solidFill>
+              </a:rPr>
+              <a:t>Fetch and Pull MASTER </a:t>
+            </a:r>
+          </a:p>
+          <a:p>
+            <a:r>
+              <a:rPr lang="en-US" sz="1200" b="1" dirty="0">
+                <a:solidFill>
+                  <a:srgbClr val="FF0000"/>
+                </a:solidFill>
+              </a:rPr>
+              <a:t>Branch in LOCAL</a:t>
+            </a:r>
+          </a:p>
+        </p:txBody>
+      </p:sp>
+      <p:cxnSp>
+        <p:nvCxnSpPr>
+          <p:cNvPr id="127" name="Conector recto de flecha 126">
+            <a:extLst>
+              <a:ext uri="{FF2B5EF4-FFF2-40B4-BE49-F238E27FC236}">
+                <a16:creationId xmlns:a16="http://schemas.microsoft.com/office/drawing/2014/main" id="{69FB2DAB-997D-4962-BED3-202F39A72D9E}"/>
+              </a:ext>
+            </a:extLst>
+          </p:cNvPr>
+          <p:cNvCxnSpPr>
+            <a:cxnSpLocks/>
+            <a:stCxn id="125" idx="1"/>
+          </p:cNvCxnSpPr>
+          <p:nvPr/>
+        </p:nvCxnSpPr>
+        <p:spPr>
+          <a:xfrm flipH="1" flipV="1">
+            <a:off x="6962736" y="3256364"/>
+            <a:ext cx="1047321" cy="836984"/>
+          </a:xfrm>
+          <a:prstGeom prst="straightConnector1">
+            <a:avLst/>
+          </a:prstGeom>
+          <a:ln w="25400">
+            <a:solidFill>
+              <a:srgbClr val="FF0000"/>
+            </a:solidFill>
+            <a:tailEnd type="arrow" w="med" len="lg"/>
+          </a:ln>
+        </p:spPr>
+        <p:style>
+          <a:lnRef idx="1">
+            <a:schemeClr val="accent1"/>
+          </a:lnRef>
+          <a:fillRef idx="0">
+            <a:schemeClr val="accent1"/>
+          </a:fillRef>
+          <a:effectRef idx="0">
+            <a:schemeClr val="accent1"/>
+          </a:effectRef>
+          <a:fontRef idx="minor">
+            <a:schemeClr val="tx1"/>
+          </a:fontRef>
+        </p:style>
+      </p:cxnSp>
+      <p:sp>
+        <p:nvSpPr>
+          <p:cNvPr id="130" name="CuadroTexto 129">
+            <a:extLst>
+              <a:ext uri="{FF2B5EF4-FFF2-40B4-BE49-F238E27FC236}">
+                <a16:creationId xmlns:a16="http://schemas.microsoft.com/office/drawing/2014/main" id="{CED4F5B9-25EB-4364-B015-9BC8F5391B25}"/>
+              </a:ext>
+            </a:extLst>
+          </p:cNvPr>
+          <p:cNvSpPr txBox="1"/>
+          <p:nvPr/>
+        </p:nvSpPr>
+        <p:spPr>
+          <a:xfrm>
+            <a:off x="4061494" y="3599529"/>
+            <a:ext cx="1459260" cy="461665"/>
+          </a:xfrm>
+          <a:prstGeom prst="rect">
+            <a:avLst/>
+          </a:prstGeom>
+          <a:noFill/>
+          <a:ln w="25400">
+            <a:solidFill>
+              <a:srgbClr val="FF0000"/>
+            </a:solidFill>
+          </a:ln>
+        </p:spPr>
+        <p:txBody>
+          <a:bodyPr wrap="square" rtlCol="0">
+            <a:spAutoFit/>
+          </a:bodyPr>
+          <a:lstStyle/>
+          <a:p>
+            <a:r>
+              <a:rPr lang="en-US" sz="1200" b="1" dirty="0">
+                <a:solidFill>
+                  <a:srgbClr val="FF0000"/>
+                </a:solidFill>
+              </a:rPr>
+              <a:t>DELETE branch in </a:t>
+            </a:r>
+          </a:p>
+          <a:p>
+            <a:r>
+              <a:rPr lang="en-US" sz="1200" b="1" dirty="0">
+                <a:solidFill>
+                  <a:srgbClr val="FF0000"/>
+                </a:solidFill>
+              </a:rPr>
+              <a:t>REMOTE and LOCAL</a:t>
+            </a:r>
+          </a:p>
+        </p:txBody>
+      </p:sp>
+      <p:cxnSp>
+        <p:nvCxnSpPr>
+          <p:cNvPr id="131" name="Conector recto de flecha 130">
+            <a:extLst>
+              <a:ext uri="{FF2B5EF4-FFF2-40B4-BE49-F238E27FC236}">
+                <a16:creationId xmlns:a16="http://schemas.microsoft.com/office/drawing/2014/main" id="{35E78DD3-E0A2-4DF1-8EF3-1BD8DA010F13}"/>
+              </a:ext>
+            </a:extLst>
+          </p:cNvPr>
+          <p:cNvCxnSpPr>
+            <a:cxnSpLocks/>
+            <a:stCxn id="130" idx="3"/>
+            <a:endCxn id="11" idx="0"/>
+          </p:cNvCxnSpPr>
+          <p:nvPr/>
+        </p:nvCxnSpPr>
+        <p:spPr>
+          <a:xfrm flipV="1">
+            <a:off x="5520754" y="3238298"/>
+            <a:ext cx="1142458" cy="592064"/>
+          </a:xfrm>
+          <a:prstGeom prst="straightConnector1">
+            <a:avLst/>
+          </a:prstGeom>
+          <a:ln w="25400">
+            <a:solidFill>
+              <a:srgbClr val="FF0000"/>
+            </a:solidFill>
+            <a:tailEnd type="arrow" w="med" len="lg"/>
+          </a:ln>
+        </p:spPr>
+        <p:style>
+          <a:lnRef idx="1">
+            <a:schemeClr val="accent1"/>
+          </a:lnRef>
+          <a:fillRef idx="0">
+            <a:schemeClr val="accent1"/>
+          </a:fillRef>
+          <a:effectRef idx="0">
+            <a:schemeClr val="accent1"/>
+          </a:effectRef>
+          <a:fontRef idx="minor">
+            <a:schemeClr val="tx1"/>
+          </a:fontRef>
+        </p:style>
+      </p:cxnSp>
+      <p:sp>
+        <p:nvSpPr>
+          <p:cNvPr id="14" name="Elipse 13">
+            <a:extLst>
+              <a:ext uri="{FF2B5EF4-FFF2-40B4-BE49-F238E27FC236}">
+                <a16:creationId xmlns:a16="http://schemas.microsoft.com/office/drawing/2014/main" id="{0154B2BE-D4D4-40C5-9191-39AD86DFECE0}"/>
+              </a:ext>
+            </a:extLst>
+          </p:cNvPr>
+          <p:cNvSpPr/>
+          <p:nvPr/>
+        </p:nvSpPr>
+        <p:spPr>
+          <a:xfrm>
+            <a:off x="4779054" y="4983526"/>
+            <a:ext cx="108000" cy="108000"/>
+          </a:xfrm>
+          <a:prstGeom prst="ellipse">
+            <a:avLst/>
+          </a:prstGeom>
+          <a:solidFill>
+            <a:srgbClr val="A1B8E1"/>
+          </a:solidFill>
+          <a:ln w="25400">
+            <a:solidFill>
+              <a:schemeClr val="tx1"/>
+            </a:solidFill>
+          </a:ln>
+        </p:spPr>
+        <p:style>
+          <a:lnRef idx="2">
+            <a:schemeClr val="accent1">
+              <a:shade val="50000"/>
+            </a:schemeClr>
+          </a:lnRef>
+          <a:fillRef idx="1">
+            <a:schemeClr val="accent1"/>
+          </a:fillRef>
+          <a:effectRef idx="0">
+            <a:schemeClr val="accent1"/>
+          </a:effectRef>
+          <a:fontRef idx="minor">
+            <a:schemeClr val="lt1"/>
+          </a:fontRef>
+        </p:style>
+        <p:txBody>
+          <a:bodyPr rtlCol="0" anchor="ctr"/>
+          <a:lstStyle/>
+          <a:p>
+            <a:pPr algn="ctr"/>
+            <a:endParaRPr lang="en-US"/>
+          </a:p>
+        </p:txBody>
+      </p:sp>
+      <p:sp>
+        <p:nvSpPr>
+          <p:cNvPr id="42" name="Elipse 41">
+            <a:extLst>
+              <a:ext uri="{FF2B5EF4-FFF2-40B4-BE49-F238E27FC236}">
+                <a16:creationId xmlns:a16="http://schemas.microsoft.com/office/drawing/2014/main" id="{A5529B91-97CB-469C-83CD-F727D92A954F}"/>
+              </a:ext>
+            </a:extLst>
+          </p:cNvPr>
+          <p:cNvSpPr/>
+          <p:nvPr/>
+        </p:nvSpPr>
+        <p:spPr>
+          <a:xfrm>
+            <a:off x="5452805" y="4983526"/>
+            <a:ext cx="108000" cy="108000"/>
+          </a:xfrm>
+          <a:prstGeom prst="ellipse">
+            <a:avLst/>
+          </a:prstGeom>
+          <a:solidFill>
+            <a:srgbClr val="A1B8E1"/>
+          </a:solidFill>
+          <a:ln w="25400">
+            <a:solidFill>
+              <a:schemeClr val="tx1"/>
+            </a:solidFill>
+          </a:ln>
+        </p:spPr>
+        <p:style>
+          <a:lnRef idx="2">
+            <a:schemeClr val="accent1">
+              <a:shade val="50000"/>
+            </a:schemeClr>
+          </a:lnRef>
+          <a:fillRef idx="1">
+            <a:schemeClr val="accent1"/>
+          </a:fillRef>
+          <a:effectRef idx="0">
+            <a:schemeClr val="accent1"/>
+          </a:effectRef>
+          <a:fontRef idx="minor">
+            <a:schemeClr val="lt1"/>
+          </a:fontRef>
+        </p:style>
+        <p:txBody>
+          <a:bodyPr rtlCol="0" anchor="ctr"/>
+          <a:lstStyle/>
+          <a:p>
+            <a:pPr algn="ctr"/>
+            <a:endParaRPr lang="en-US"/>
+          </a:p>
+        </p:txBody>
+      </p:sp>
+      <p:sp>
+        <p:nvSpPr>
+          <p:cNvPr id="43" name="Elipse 42">
+            <a:extLst>
+              <a:ext uri="{FF2B5EF4-FFF2-40B4-BE49-F238E27FC236}">
+                <a16:creationId xmlns:a16="http://schemas.microsoft.com/office/drawing/2014/main" id="{D868F19D-59D3-4B66-83C1-9D268BE20F81}"/>
+              </a:ext>
+            </a:extLst>
+          </p:cNvPr>
+          <p:cNvSpPr/>
+          <p:nvPr/>
+        </p:nvSpPr>
+        <p:spPr>
+          <a:xfrm>
+            <a:off x="5302361" y="1396314"/>
+            <a:ext cx="108000" cy="108000"/>
+          </a:xfrm>
+          <a:prstGeom prst="ellipse">
+            <a:avLst/>
+          </a:prstGeom>
+          <a:solidFill>
+            <a:srgbClr val="ACACAC"/>
+          </a:solidFill>
+          <a:ln w="25400">
+            <a:solidFill>
+              <a:schemeClr val="tx1"/>
+            </a:solidFill>
+          </a:ln>
+        </p:spPr>
+        <p:style>
+          <a:lnRef idx="2">
+            <a:schemeClr val="accent1">
+              <a:shade val="50000"/>
+            </a:schemeClr>
+          </a:lnRef>
+          <a:fillRef idx="1">
+            <a:schemeClr val="accent1"/>
+          </a:fillRef>
+          <a:effectRef idx="0">
+            <a:schemeClr val="accent1"/>
+          </a:effectRef>
+          <a:fontRef idx="minor">
+            <a:schemeClr val="lt1"/>
+          </a:fontRef>
+        </p:style>
+        <p:txBody>
+          <a:bodyPr rtlCol="0" anchor="ctr"/>
+          <a:lstStyle/>
+          <a:p>
+            <a:pPr algn="ctr"/>
+            <a:endParaRPr lang="en-US"/>
+          </a:p>
+        </p:txBody>
+      </p:sp>
+      <p:sp>
+        <p:nvSpPr>
+          <p:cNvPr id="44" name="Elipse 43">
+            <a:extLst>
+              <a:ext uri="{FF2B5EF4-FFF2-40B4-BE49-F238E27FC236}">
+                <a16:creationId xmlns:a16="http://schemas.microsoft.com/office/drawing/2014/main" id="{9D02579F-5F22-4D49-AC2B-5FA54D24AABE}"/>
+              </a:ext>
+            </a:extLst>
+          </p:cNvPr>
+          <p:cNvSpPr/>
+          <p:nvPr/>
+        </p:nvSpPr>
+        <p:spPr>
+          <a:xfrm>
+            <a:off x="5765375" y="1396314"/>
+            <a:ext cx="108000" cy="108000"/>
+          </a:xfrm>
+          <a:prstGeom prst="ellipse">
+            <a:avLst/>
+          </a:prstGeom>
+          <a:solidFill>
+            <a:srgbClr val="ACACAC"/>
+          </a:solidFill>
+          <a:ln w="25400">
+            <a:solidFill>
+              <a:schemeClr val="tx1"/>
+            </a:solidFill>
+          </a:ln>
+        </p:spPr>
+        <p:style>
+          <a:lnRef idx="2">
+            <a:schemeClr val="accent1">
+              <a:shade val="50000"/>
+            </a:schemeClr>
+          </a:lnRef>
+          <a:fillRef idx="1">
+            <a:schemeClr val="accent1"/>
+          </a:fillRef>
+          <a:effectRef idx="0">
+            <a:schemeClr val="accent1"/>
+          </a:effectRef>
+          <a:fontRef idx="minor">
+            <a:schemeClr val="lt1"/>
+          </a:fontRef>
+        </p:style>
+        <p:txBody>
+          <a:bodyPr rtlCol="0" anchor="ctr"/>
+          <a:lstStyle/>
+          <a:p>
+            <a:pPr algn="ctr"/>
+            <a:endParaRPr lang="en-US"/>
+          </a:p>
+        </p:txBody>
+      </p:sp>
+      <p:sp>
+        <p:nvSpPr>
+          <p:cNvPr id="45" name="Elipse 44">
+            <a:extLst>
+              <a:ext uri="{FF2B5EF4-FFF2-40B4-BE49-F238E27FC236}">
+                <a16:creationId xmlns:a16="http://schemas.microsoft.com/office/drawing/2014/main" id="{291726FA-DB13-45F9-AC2B-5F7839EBCC3C}"/>
+              </a:ext>
+            </a:extLst>
+          </p:cNvPr>
+          <p:cNvSpPr/>
+          <p:nvPr/>
+        </p:nvSpPr>
+        <p:spPr>
+          <a:xfrm>
+            <a:off x="6407114" y="1396314"/>
+            <a:ext cx="108000" cy="108000"/>
+          </a:xfrm>
+          <a:prstGeom prst="ellipse">
+            <a:avLst/>
+          </a:prstGeom>
+          <a:solidFill>
+            <a:srgbClr val="ACACAC"/>
+          </a:solidFill>
+          <a:ln w="25400">
+            <a:solidFill>
+              <a:schemeClr val="tx1"/>
+            </a:solidFill>
+          </a:ln>
+        </p:spPr>
+        <p:style>
+          <a:lnRef idx="2">
+            <a:schemeClr val="accent1">
+              <a:shade val="50000"/>
+            </a:schemeClr>
+          </a:lnRef>
+          <a:fillRef idx="1">
+            <a:schemeClr val="accent1"/>
+          </a:fillRef>
+          <a:effectRef idx="0">
+            <a:schemeClr val="accent1"/>
+          </a:effectRef>
+          <a:fontRef idx="minor">
+            <a:schemeClr val="lt1"/>
+          </a:fontRef>
+        </p:style>
+        <p:txBody>
+          <a:bodyPr rtlCol="0" anchor="ctr"/>
+          <a:lstStyle/>
+          <a:p>
+            <a:pPr algn="ctr"/>
+            <a:endParaRPr lang="en-US"/>
+          </a:p>
+        </p:txBody>
+      </p:sp>
+      <p:sp>
+        <p:nvSpPr>
+          <p:cNvPr id="46" name="CuadroTexto 45">
+            <a:extLst>
+              <a:ext uri="{FF2B5EF4-FFF2-40B4-BE49-F238E27FC236}">
+                <a16:creationId xmlns:a16="http://schemas.microsoft.com/office/drawing/2014/main" id="{8A6B4562-FBCE-4C0C-9D2B-836D62E587FC}"/>
+              </a:ext>
+            </a:extLst>
+          </p:cNvPr>
+          <p:cNvSpPr txBox="1"/>
+          <p:nvPr/>
+        </p:nvSpPr>
+        <p:spPr>
+          <a:xfrm>
+            <a:off x="5452805" y="1105463"/>
+            <a:ext cx="733727" cy="276999"/>
+          </a:xfrm>
+          <a:prstGeom prst="rect">
+            <a:avLst/>
+          </a:prstGeom>
+          <a:noFill/>
+        </p:spPr>
+        <p:txBody>
+          <a:bodyPr wrap="none" rtlCol="0">
+            <a:spAutoFit/>
+          </a:bodyPr>
+          <a:lstStyle/>
+          <a:p>
+            <a:pPr algn="ctr"/>
+            <a:r>
+              <a:rPr lang="en-US" sz="1200" b="1" dirty="0"/>
+              <a:t>commits</a:t>
+            </a:r>
+          </a:p>
+        </p:txBody>
+      </p:sp>
+    </p:spTree>
+    <p:extLst>
+      <p:ext uri="{BB962C8B-B14F-4D97-AF65-F5344CB8AC3E}">
+        <p14:creationId xmlns:p14="http://schemas.microsoft.com/office/powerpoint/2010/main" val="502299726"/>
+      </p:ext>
+    </p:extLst>
+  </p:cSld>
+  <p:clrMapOvr>
+    <a:masterClrMapping/>
+  </p:clrMapOvr>
+</p:sld>
+</file>
+
+<file path=ppt/slides/slide3.xml><?xml version="1.0" encoding="utf-8"?>
+<p:sld xmlns:a="http://schemas.openxmlformats.org/drawingml/2006/main" xmlns:r="http://schemas.openxmlformats.org/officeDocument/2006/relationships" xmlns:p="http://schemas.openxmlformats.org/presentationml/2006/main">
+  <p:cSld>
+    <p:spTree>
+      <p:nvGrpSpPr>
+        <p:cNvPr id="1" name=""/>
+        <p:cNvGrpSpPr/>
+        <p:nvPr/>
+      </p:nvGrpSpPr>
+      <p:grpSpPr>
+        <a:xfrm>
+          <a:off x="0" y="0"/>
+          <a:ext cx="0" cy="0"/>
+          <a:chOff x="0" y="0"/>
+          <a:chExt cx="0" cy="0"/>
+        </a:xfrm>
+      </p:grpSpPr>
+    </p:spTree>
+    <p:extLst>
+      <p:ext uri="{BB962C8B-B14F-4D97-AF65-F5344CB8AC3E}">
+        <p14:creationId xmlns:p14="http://schemas.microsoft.com/office/powerpoint/2010/main" val="2873464480"/>
+      </p:ext>
+    </p:extLst>
+  </p:cSld>
+  <p:clrMapOvr>
+    <a:masterClrMapping/>
+  </p:clrMapOvr>
+</p:sld>
+</file>
+
 <file path=ppt/theme/theme1.xml><?xml version="1.0" encoding="utf-8"?>
 <a:theme xmlns:a="http://schemas.openxmlformats.org/drawingml/2006/main" name="Tema de Office">
   <a:themeElements>

</xml_diff>

<commit_message>
7.7 - 7.9 and Workflow picture
</commit_message>
<xml_diff>
--- a/doc/Figures/temp/tempStateDiagramGH.pptx
+++ b/doc/Figures/temp/tempStateDiagramGH.pptx
@@ -263,7 +263,7 @@
           <a:p>
             <a:fld id="{786B9184-6E77-4DA2-9A6A-FCC44F32A373}" type="datetimeFigureOut">
               <a:rPr lang="en-GB" smtClean="0"/>
-              <a:t>17/11/2021</a:t>
+              <a:t>27/11/2021</a:t>
             </a:fld>
             <a:endParaRPr lang="en-GB"/>
           </a:p>
@@ -463,7 +463,7 @@
           <a:p>
             <a:fld id="{786B9184-6E77-4DA2-9A6A-FCC44F32A373}" type="datetimeFigureOut">
               <a:rPr lang="en-GB" smtClean="0"/>
-              <a:t>17/11/2021</a:t>
+              <a:t>27/11/2021</a:t>
             </a:fld>
             <a:endParaRPr lang="en-GB"/>
           </a:p>
@@ -673,7 +673,7 @@
           <a:p>
             <a:fld id="{786B9184-6E77-4DA2-9A6A-FCC44F32A373}" type="datetimeFigureOut">
               <a:rPr lang="en-GB" smtClean="0"/>
-              <a:t>17/11/2021</a:t>
+              <a:t>27/11/2021</a:t>
             </a:fld>
             <a:endParaRPr lang="en-GB"/>
           </a:p>
@@ -873,7 +873,7 @@
           <a:p>
             <a:fld id="{786B9184-6E77-4DA2-9A6A-FCC44F32A373}" type="datetimeFigureOut">
               <a:rPr lang="en-GB" smtClean="0"/>
-              <a:t>17/11/2021</a:t>
+              <a:t>27/11/2021</a:t>
             </a:fld>
             <a:endParaRPr lang="en-GB"/>
           </a:p>
@@ -1149,7 +1149,7 @@
           <a:p>
             <a:fld id="{786B9184-6E77-4DA2-9A6A-FCC44F32A373}" type="datetimeFigureOut">
               <a:rPr lang="en-GB" smtClean="0"/>
-              <a:t>17/11/2021</a:t>
+              <a:t>27/11/2021</a:t>
             </a:fld>
             <a:endParaRPr lang="en-GB"/>
           </a:p>
@@ -1417,7 +1417,7 @@
           <a:p>
             <a:fld id="{786B9184-6E77-4DA2-9A6A-FCC44F32A373}" type="datetimeFigureOut">
               <a:rPr lang="en-GB" smtClean="0"/>
-              <a:t>17/11/2021</a:t>
+              <a:t>27/11/2021</a:t>
             </a:fld>
             <a:endParaRPr lang="en-GB"/>
           </a:p>
@@ -1832,7 +1832,7 @@
           <a:p>
             <a:fld id="{786B9184-6E77-4DA2-9A6A-FCC44F32A373}" type="datetimeFigureOut">
               <a:rPr lang="en-GB" smtClean="0"/>
-              <a:t>17/11/2021</a:t>
+              <a:t>27/11/2021</a:t>
             </a:fld>
             <a:endParaRPr lang="en-GB"/>
           </a:p>
@@ -1974,7 +1974,7 @@
           <a:p>
             <a:fld id="{786B9184-6E77-4DA2-9A6A-FCC44F32A373}" type="datetimeFigureOut">
               <a:rPr lang="en-GB" smtClean="0"/>
-              <a:t>17/11/2021</a:t>
+              <a:t>27/11/2021</a:t>
             </a:fld>
             <a:endParaRPr lang="en-GB"/>
           </a:p>
@@ -2087,7 +2087,7 @@
           <a:p>
             <a:fld id="{786B9184-6E77-4DA2-9A6A-FCC44F32A373}" type="datetimeFigureOut">
               <a:rPr lang="en-GB" smtClean="0"/>
-              <a:t>17/11/2021</a:t>
+              <a:t>27/11/2021</a:t>
             </a:fld>
             <a:endParaRPr lang="en-GB"/>
           </a:p>
@@ -2400,7 +2400,7 @@
           <a:p>
             <a:fld id="{786B9184-6E77-4DA2-9A6A-FCC44F32A373}" type="datetimeFigureOut">
               <a:rPr lang="en-GB" smtClean="0"/>
-              <a:t>17/11/2021</a:t>
+              <a:t>27/11/2021</a:t>
             </a:fld>
             <a:endParaRPr lang="en-GB"/>
           </a:p>
@@ -2689,7 +2689,7 @@
           <a:p>
             <a:fld id="{786B9184-6E77-4DA2-9A6A-FCC44F32A373}" type="datetimeFigureOut">
               <a:rPr lang="en-GB" smtClean="0"/>
-              <a:t>17/11/2021</a:t>
+              <a:t>27/11/2021</a:t>
             </a:fld>
             <a:endParaRPr lang="en-GB"/>
           </a:p>
@@ -2932,7 +2932,7 @@
           <a:p>
             <a:fld id="{786B9184-6E77-4DA2-9A6A-FCC44F32A373}" type="datetimeFigureOut">
               <a:rPr lang="en-GB" smtClean="0"/>
-              <a:t>17/11/2021</a:t>
+              <a:t>27/11/2021</a:t>
             </a:fld>
             <a:endParaRPr lang="en-GB"/>
           </a:p>
@@ -5116,1004 +5116,33 @@
           <a:chExt cx="0" cy="0"/>
         </a:xfrm>
       </p:grpSpPr>
-      <p:sp>
-        <p:nvSpPr>
-          <p:cNvPr id="10" name="Rectángulo 9">
-            <a:extLst>
-              <a:ext uri="{FF2B5EF4-FFF2-40B4-BE49-F238E27FC236}">
-                <a16:creationId xmlns:a16="http://schemas.microsoft.com/office/drawing/2014/main" id="{119579E0-D158-4F77-94AE-0232247F8A8B}"/>
-              </a:ext>
-            </a:extLst>
-          </p:cNvPr>
-          <p:cNvSpPr/>
-          <p:nvPr/>
-        </p:nvSpPr>
-        <p:spPr>
-          <a:xfrm>
-            <a:off x="1392571" y="604008"/>
-            <a:ext cx="10541282" cy="2634290"/>
-          </a:xfrm>
-          <a:prstGeom prst="rect">
-            <a:avLst/>
-          </a:prstGeom>
-          <a:solidFill>
-            <a:schemeClr val="tx1">
-              <a:lumMod val="65000"/>
-              <a:lumOff val="35000"/>
-              <a:alpha val="50000"/>
-            </a:schemeClr>
-          </a:solidFill>
-          <a:ln>
-            <a:noFill/>
-          </a:ln>
-        </p:spPr>
-        <p:style>
-          <a:lnRef idx="2">
-            <a:schemeClr val="accent1">
-              <a:shade val="50000"/>
-            </a:schemeClr>
-          </a:lnRef>
-          <a:fillRef idx="1">
-            <a:schemeClr val="accent1"/>
-          </a:fillRef>
-          <a:effectRef idx="0">
-            <a:schemeClr val="accent1"/>
-          </a:effectRef>
-          <a:fontRef idx="minor">
-            <a:schemeClr val="lt1"/>
-          </a:fontRef>
-        </p:style>
-        <p:txBody>
-          <a:bodyPr rtlCol="0" anchor="ctr"/>
-          <a:lstStyle/>
-          <a:p>
-            <a:pPr algn="ctr"/>
-            <a:endParaRPr lang="en-US"/>
-          </a:p>
-        </p:txBody>
-      </p:sp>
-      <p:sp>
-        <p:nvSpPr>
-          <p:cNvPr id="11" name="Rectángulo 10">
-            <a:extLst>
-              <a:ext uri="{FF2B5EF4-FFF2-40B4-BE49-F238E27FC236}">
-                <a16:creationId xmlns:a16="http://schemas.microsoft.com/office/drawing/2014/main" id="{9895E96B-0347-41FB-999B-4ED4437414D9}"/>
-              </a:ext>
-            </a:extLst>
-          </p:cNvPr>
-          <p:cNvSpPr/>
-          <p:nvPr/>
-        </p:nvSpPr>
-        <p:spPr>
-          <a:xfrm>
-            <a:off x="1392571" y="3238298"/>
-            <a:ext cx="10541282" cy="2634290"/>
-          </a:xfrm>
-          <a:prstGeom prst="rect">
-            <a:avLst/>
-          </a:prstGeom>
-          <a:solidFill>
-            <a:schemeClr val="accent1">
-              <a:alpha val="50000"/>
-            </a:schemeClr>
-          </a:solidFill>
-          <a:ln>
-            <a:noFill/>
-          </a:ln>
-        </p:spPr>
-        <p:style>
-          <a:lnRef idx="2">
-            <a:schemeClr val="accent1">
-              <a:shade val="50000"/>
-            </a:schemeClr>
-          </a:lnRef>
-          <a:fillRef idx="1">
-            <a:schemeClr val="accent1"/>
-          </a:fillRef>
-          <a:effectRef idx="0">
-            <a:schemeClr val="accent1"/>
-          </a:effectRef>
-          <a:fontRef idx="minor">
-            <a:schemeClr val="lt1"/>
-          </a:fontRef>
-        </p:style>
-        <p:txBody>
-          <a:bodyPr rtlCol="0" anchor="ctr"/>
-          <a:lstStyle/>
-          <a:p>
-            <a:pPr algn="ctr"/>
-            <a:endParaRPr lang="en-US" dirty="0"/>
-          </a:p>
-        </p:txBody>
-      </p:sp>
       <p:cxnSp>
         <p:nvCxnSpPr>
-          <p:cNvPr id="2" name="Conector recto de flecha 1">
-            <a:extLst>
-              <a:ext uri="{FF2B5EF4-FFF2-40B4-BE49-F238E27FC236}">
-                <a16:creationId xmlns:a16="http://schemas.microsoft.com/office/drawing/2014/main" id="{55CC1AF4-7FC0-42DF-9794-320442F4BFA5}"/>
+          <p:cNvPr id="105" name="Conector recto 104">
+            <a:extLst>
+              <a:ext uri="{FF2B5EF4-FFF2-40B4-BE49-F238E27FC236}">
+                <a16:creationId xmlns:a16="http://schemas.microsoft.com/office/drawing/2014/main" id="{B019CD6C-E857-414A-BCB7-968FC0B619DA}"/>
               </a:ext>
             </a:extLst>
           </p:cNvPr>
           <p:cNvCxnSpPr>
             <a:cxnSpLocks/>
+            <a:stCxn id="11" idx="1"/>
+            <a:endCxn id="11" idx="3"/>
           </p:cNvCxnSpPr>
           <p:nvPr/>
         </p:nvCxnSpPr>
         <p:spPr>
-          <a:xfrm flipV="1">
-            <a:off x="1392571" y="3232858"/>
-            <a:ext cx="8581853" cy="5440"/>
-          </a:xfrm>
-          <a:prstGeom prst="straightConnector1">
-            <a:avLst/>
-          </a:prstGeom>
-          <a:ln w="63500">
-            <a:solidFill>
-              <a:schemeClr val="tx1"/>
-            </a:solidFill>
-            <a:headEnd type="none"/>
-            <a:tailEnd type="arrow" w="med" len="lg"/>
-          </a:ln>
-        </p:spPr>
-        <p:style>
-          <a:lnRef idx="1">
-            <a:schemeClr val="accent1"/>
-          </a:lnRef>
-          <a:fillRef idx="0">
-            <a:schemeClr val="accent1"/>
-          </a:fillRef>
-          <a:effectRef idx="0">
-            <a:schemeClr val="accent1"/>
-          </a:effectRef>
-          <a:fontRef idx="minor">
-            <a:schemeClr val="tx1"/>
-          </a:fontRef>
-        </p:style>
-      </p:cxnSp>
-      <p:sp>
-        <p:nvSpPr>
-          <p:cNvPr id="5" name="CuadroTexto 4">
-            <a:extLst>
-              <a:ext uri="{FF2B5EF4-FFF2-40B4-BE49-F238E27FC236}">
-                <a16:creationId xmlns:a16="http://schemas.microsoft.com/office/drawing/2014/main" id="{78E68BE9-6066-499F-86AA-6CA10930D7F5}"/>
-              </a:ext>
-            </a:extLst>
-          </p:cNvPr>
-          <p:cNvSpPr txBox="1"/>
-          <p:nvPr/>
-        </p:nvSpPr>
-        <p:spPr>
-          <a:xfrm>
-            <a:off x="1392569" y="2321239"/>
-            <a:ext cx="1710147" cy="584775"/>
-          </a:xfrm>
-          <a:prstGeom prst="rect">
-            <a:avLst/>
-          </a:prstGeom>
-          <a:noFill/>
-        </p:spPr>
-        <p:txBody>
-          <a:bodyPr wrap="none" rtlCol="0">
-            <a:spAutoFit/>
-          </a:bodyPr>
-          <a:lstStyle/>
-          <a:p>
-            <a:pPr algn="ctr"/>
-            <a:r>
-              <a:rPr lang="en-US" sz="1600" b="1" dirty="0"/>
-              <a:t>COLLABORATOR 1</a:t>
-            </a:r>
-          </a:p>
-          <a:p>
-            <a:pPr algn="ctr"/>
-            <a:r>
-              <a:rPr lang="en-US" sz="1600" b="1" dirty="0"/>
-              <a:t>REMOTE</a:t>
-            </a:r>
-          </a:p>
-        </p:txBody>
-      </p:sp>
-      <p:sp>
-        <p:nvSpPr>
-          <p:cNvPr id="9" name="CuadroTexto 8">
-            <a:extLst>
-              <a:ext uri="{FF2B5EF4-FFF2-40B4-BE49-F238E27FC236}">
-                <a16:creationId xmlns:a16="http://schemas.microsoft.com/office/drawing/2014/main" id="{A0516147-A43F-494B-968F-6AFECB012FBC}"/>
-              </a:ext>
-            </a:extLst>
-          </p:cNvPr>
-          <p:cNvSpPr txBox="1"/>
-          <p:nvPr/>
-        </p:nvSpPr>
-        <p:spPr>
-          <a:xfrm>
-            <a:off x="1350294" y="3700348"/>
-            <a:ext cx="1710147" cy="584775"/>
-          </a:xfrm>
-          <a:prstGeom prst="rect">
-            <a:avLst/>
-          </a:prstGeom>
-          <a:noFill/>
-        </p:spPr>
-        <p:txBody>
-          <a:bodyPr wrap="none" rtlCol="0">
-            <a:spAutoFit/>
-          </a:bodyPr>
-          <a:lstStyle/>
-          <a:p>
-            <a:pPr algn="ctr"/>
-            <a:r>
-              <a:rPr lang="en-US" sz="1600" b="1" dirty="0">
-                <a:solidFill>
-                  <a:schemeClr val="accent1">
-                    <a:lumMod val="50000"/>
-                  </a:schemeClr>
-                </a:solidFill>
-              </a:rPr>
-              <a:t>COLLABORATOR 2</a:t>
-            </a:r>
-          </a:p>
-          <a:p>
-            <a:pPr algn="ctr"/>
-            <a:r>
-              <a:rPr lang="en-US" sz="1600" b="1" dirty="0">
-                <a:solidFill>
-                  <a:schemeClr val="accent1">
-                    <a:lumMod val="50000"/>
-                  </a:schemeClr>
-                </a:solidFill>
-              </a:rPr>
-              <a:t>REMOTE</a:t>
-            </a:r>
-          </a:p>
-        </p:txBody>
-      </p:sp>
-      <p:cxnSp>
-        <p:nvCxnSpPr>
-          <p:cNvPr id="19" name="Conector: angular 18">
-            <a:extLst>
-              <a:ext uri="{FF2B5EF4-FFF2-40B4-BE49-F238E27FC236}">
-                <a16:creationId xmlns:a16="http://schemas.microsoft.com/office/drawing/2014/main" id="{AFD1E0CF-EC68-434F-A7FD-89009CCE9FB6}"/>
-              </a:ext>
-            </a:extLst>
-          </p:cNvPr>
-          <p:cNvCxnSpPr>
-            <a:cxnSpLocks/>
-            <a:endCxn id="82" idx="2"/>
-          </p:cNvCxnSpPr>
-          <p:nvPr/>
-        </p:nvCxnSpPr>
-        <p:spPr>
-          <a:xfrm>
-            <a:off x="3517641" y="3232858"/>
-            <a:ext cx="3143393" cy="894503"/>
-          </a:xfrm>
-          <a:prstGeom prst="bentConnector4">
-            <a:avLst>
-              <a:gd name="adj1" fmla="val 3"/>
-              <a:gd name="adj2" fmla="val 201159"/>
-            </a:avLst>
-          </a:prstGeom>
-          <a:ln w="25400">
-            <a:solidFill>
-              <a:schemeClr val="tx1"/>
-            </a:solidFill>
-            <a:tailEnd type="arrow" w="med" len="lg"/>
-          </a:ln>
-        </p:spPr>
-        <p:style>
-          <a:lnRef idx="1">
-            <a:schemeClr val="accent1"/>
-          </a:lnRef>
-          <a:fillRef idx="0">
-            <a:schemeClr val="accent1"/>
-          </a:fillRef>
-          <a:effectRef idx="0">
-            <a:schemeClr val="accent1"/>
-          </a:effectRef>
-          <a:fontRef idx="minor">
-            <a:schemeClr val="tx1"/>
-          </a:fontRef>
-        </p:style>
-      </p:cxnSp>
-      <p:sp>
-        <p:nvSpPr>
-          <p:cNvPr id="28" name="CuadroTexto 27">
-            <a:extLst>
-              <a:ext uri="{FF2B5EF4-FFF2-40B4-BE49-F238E27FC236}">
-                <a16:creationId xmlns:a16="http://schemas.microsoft.com/office/drawing/2014/main" id="{E7D338A0-9D69-4B2A-BC05-293E926B85F1}"/>
-              </a:ext>
-            </a:extLst>
-          </p:cNvPr>
-          <p:cNvSpPr txBox="1"/>
-          <p:nvPr/>
-        </p:nvSpPr>
-        <p:spPr>
-          <a:xfrm>
-            <a:off x="9961092" y="3066301"/>
-            <a:ext cx="1676677" cy="338554"/>
-          </a:xfrm>
-          <a:prstGeom prst="rect">
-            <a:avLst/>
-          </a:prstGeom>
-          <a:noFill/>
-        </p:spPr>
-        <p:txBody>
-          <a:bodyPr wrap="none" rtlCol="0">
-            <a:spAutoFit/>
-          </a:bodyPr>
-          <a:lstStyle/>
-          <a:p>
-            <a:pPr algn="ctr"/>
-            <a:r>
-              <a:rPr lang="en-US" sz="1600" b="1" dirty="0"/>
-              <a:t>MASTER BRANCH</a:t>
-            </a:r>
-          </a:p>
-        </p:txBody>
-      </p:sp>
-      <p:cxnSp>
-        <p:nvCxnSpPr>
-          <p:cNvPr id="63" name="Conector: angular 62">
-            <a:extLst>
-              <a:ext uri="{FF2B5EF4-FFF2-40B4-BE49-F238E27FC236}">
-                <a16:creationId xmlns:a16="http://schemas.microsoft.com/office/drawing/2014/main" id="{1B92616A-C6FC-4707-8E4A-F6E15845C2F3}"/>
-              </a:ext>
-            </a:extLst>
-          </p:cNvPr>
-          <p:cNvCxnSpPr>
-            <a:cxnSpLocks/>
-            <a:endCxn id="90" idx="0"/>
-          </p:cNvCxnSpPr>
-          <p:nvPr/>
-        </p:nvCxnSpPr>
-        <p:spPr>
-          <a:xfrm flipV="1">
-            <a:off x="4349313" y="2305832"/>
-            <a:ext cx="3145571" cy="937906"/>
-          </a:xfrm>
-          <a:prstGeom prst="bentConnector4">
-            <a:avLst>
-              <a:gd name="adj1" fmla="val 340"/>
-              <a:gd name="adj2" fmla="val 191400"/>
-            </a:avLst>
-          </a:prstGeom>
-          <a:ln w="25400">
-            <a:solidFill>
-              <a:schemeClr val="tx1"/>
-            </a:solidFill>
-            <a:tailEnd type="arrow" w="med" len="lg"/>
-          </a:ln>
-        </p:spPr>
-        <p:style>
-          <a:lnRef idx="1">
-            <a:schemeClr val="accent1"/>
-          </a:lnRef>
-          <a:fillRef idx="0">
-            <a:schemeClr val="accent1"/>
-          </a:fillRef>
-          <a:effectRef idx="0">
-            <a:schemeClr val="accent1"/>
-          </a:effectRef>
-          <a:fontRef idx="minor">
-            <a:schemeClr val="tx1"/>
-          </a:fontRef>
-        </p:style>
-      </p:cxnSp>
-      <p:sp>
-        <p:nvSpPr>
-          <p:cNvPr id="67" name="CuadroTexto 66">
-            <a:extLst>
-              <a:ext uri="{FF2B5EF4-FFF2-40B4-BE49-F238E27FC236}">
-                <a16:creationId xmlns:a16="http://schemas.microsoft.com/office/drawing/2014/main" id="{DD5AF870-9674-447A-A164-4F1782F517BA}"/>
-              </a:ext>
-            </a:extLst>
-          </p:cNvPr>
-          <p:cNvSpPr txBox="1"/>
-          <p:nvPr/>
-        </p:nvSpPr>
-        <p:spPr>
-          <a:xfrm>
-            <a:off x="3517641" y="4741101"/>
-            <a:ext cx="1073692" cy="276999"/>
-          </a:xfrm>
-          <a:prstGeom prst="rect">
-            <a:avLst/>
-          </a:prstGeom>
-          <a:noFill/>
-        </p:spPr>
-        <p:txBody>
-          <a:bodyPr wrap="none" rtlCol="0">
-            <a:spAutoFit/>
-          </a:bodyPr>
-          <a:lstStyle/>
-          <a:p>
-            <a:pPr algn="ctr"/>
-            <a:r>
-              <a:rPr lang="en-US" sz="1200" b="1" dirty="0" err="1">
-                <a:solidFill>
-                  <a:schemeClr val="accent1">
-                    <a:lumMod val="50000"/>
-                  </a:schemeClr>
-                </a:solidFill>
-              </a:rPr>
-              <a:t>TaskA_Branch</a:t>
-            </a:r>
-            <a:endParaRPr lang="en-US" sz="1200" b="1" dirty="0">
-              <a:solidFill>
-                <a:schemeClr val="accent1">
-                  <a:lumMod val="50000"/>
-                </a:schemeClr>
-              </a:solidFill>
-            </a:endParaRPr>
-          </a:p>
-        </p:txBody>
-      </p:sp>
-      <p:sp>
-        <p:nvSpPr>
-          <p:cNvPr id="68" name="CuadroTexto 67">
-            <a:extLst>
-              <a:ext uri="{FF2B5EF4-FFF2-40B4-BE49-F238E27FC236}">
-                <a16:creationId xmlns:a16="http://schemas.microsoft.com/office/drawing/2014/main" id="{B88D6941-CA3F-433C-B3F0-5060152C7397}"/>
-              </a:ext>
-            </a:extLst>
-          </p:cNvPr>
-          <p:cNvSpPr txBox="1"/>
-          <p:nvPr/>
-        </p:nvSpPr>
-        <p:spPr>
-          <a:xfrm>
-            <a:off x="4247058" y="1195542"/>
-            <a:ext cx="1067280" cy="276999"/>
-          </a:xfrm>
-          <a:prstGeom prst="rect">
-            <a:avLst/>
-          </a:prstGeom>
-          <a:noFill/>
-        </p:spPr>
-        <p:txBody>
-          <a:bodyPr wrap="none" rtlCol="0">
-            <a:spAutoFit/>
-          </a:bodyPr>
-          <a:lstStyle/>
-          <a:p>
-            <a:pPr algn="ctr"/>
-            <a:r>
-              <a:rPr lang="en-US" sz="1200" b="1" dirty="0" err="1"/>
-              <a:t>TaskB_Branch</a:t>
-            </a:r>
-            <a:endParaRPr lang="en-US" sz="1200" b="1" dirty="0"/>
-          </a:p>
-        </p:txBody>
-      </p:sp>
-      <p:sp>
-        <p:nvSpPr>
-          <p:cNvPr id="75" name="CuadroTexto 74">
-            <a:extLst>
-              <a:ext uri="{FF2B5EF4-FFF2-40B4-BE49-F238E27FC236}">
-                <a16:creationId xmlns:a16="http://schemas.microsoft.com/office/drawing/2014/main" id="{74FFC284-674C-4257-9B5D-4DDBCF462D0A}"/>
-              </a:ext>
-            </a:extLst>
-          </p:cNvPr>
-          <p:cNvSpPr txBox="1"/>
-          <p:nvPr/>
-        </p:nvSpPr>
-        <p:spPr>
-          <a:xfrm>
-            <a:off x="7513762" y="2758567"/>
-            <a:ext cx="1341521" cy="461665"/>
-          </a:xfrm>
-          <a:prstGeom prst="rect">
-            <a:avLst/>
-          </a:prstGeom>
-          <a:noFill/>
-        </p:spPr>
-        <p:txBody>
-          <a:bodyPr wrap="none" rtlCol="0">
-            <a:spAutoFit/>
-          </a:bodyPr>
-          <a:lstStyle/>
-          <a:p>
-            <a:r>
-              <a:rPr lang="en-US" sz="1200" b="1" dirty="0"/>
-              <a:t>MERGE Branch</a:t>
-            </a:r>
-          </a:p>
-          <a:p>
-            <a:r>
-              <a:rPr lang="en-US" sz="1200" b="1" dirty="0"/>
-              <a:t>Conflicts to solve?</a:t>
-            </a:r>
-          </a:p>
-        </p:txBody>
-      </p:sp>
-      <p:sp>
-        <p:nvSpPr>
-          <p:cNvPr id="76" name="CuadroTexto 75">
-            <a:extLst>
-              <a:ext uri="{FF2B5EF4-FFF2-40B4-BE49-F238E27FC236}">
-                <a16:creationId xmlns:a16="http://schemas.microsoft.com/office/drawing/2014/main" id="{80607030-97D4-452E-982F-AD893FD39CCF}"/>
-              </a:ext>
-            </a:extLst>
-          </p:cNvPr>
-          <p:cNvSpPr txBox="1"/>
-          <p:nvPr/>
-        </p:nvSpPr>
-        <p:spPr>
-          <a:xfrm>
-            <a:off x="5596788" y="2912134"/>
-            <a:ext cx="1132233" cy="276999"/>
-          </a:xfrm>
-          <a:prstGeom prst="rect">
-            <a:avLst/>
-          </a:prstGeom>
-          <a:noFill/>
-        </p:spPr>
-        <p:txBody>
-          <a:bodyPr wrap="none" rtlCol="0">
-            <a:spAutoFit/>
-          </a:bodyPr>
-          <a:lstStyle/>
-          <a:p>
-            <a:r>
-              <a:rPr lang="en-US" sz="1200" b="1" dirty="0">
-                <a:solidFill>
-                  <a:schemeClr val="accent1">
-                    <a:lumMod val="50000"/>
-                  </a:schemeClr>
-                </a:solidFill>
-              </a:rPr>
-              <a:t>MERGE Branch</a:t>
-            </a:r>
-          </a:p>
-        </p:txBody>
-      </p:sp>
-      <p:sp>
-        <p:nvSpPr>
-          <p:cNvPr id="77" name="Rectángulo 76">
-            <a:extLst>
-              <a:ext uri="{FF2B5EF4-FFF2-40B4-BE49-F238E27FC236}">
-                <a16:creationId xmlns:a16="http://schemas.microsoft.com/office/drawing/2014/main" id="{B6BA923C-7215-4448-B752-D6AA62855A0B}"/>
-              </a:ext>
-            </a:extLst>
-          </p:cNvPr>
-          <p:cNvSpPr/>
-          <p:nvPr/>
-        </p:nvSpPr>
-        <p:spPr>
-          <a:xfrm>
-            <a:off x="1392571" y="614034"/>
-            <a:ext cx="10541282" cy="5258554"/>
-          </a:xfrm>
-          <a:prstGeom prst="rect">
-            <a:avLst/>
-          </a:prstGeom>
-          <a:noFill/>
-          <a:ln w="25400">
-            <a:solidFill>
-              <a:schemeClr val="tx1"/>
-            </a:solidFill>
-          </a:ln>
-        </p:spPr>
-        <p:style>
-          <a:lnRef idx="2">
-            <a:schemeClr val="accent1">
-              <a:shade val="50000"/>
-            </a:schemeClr>
-          </a:lnRef>
-          <a:fillRef idx="1">
-            <a:schemeClr val="accent1"/>
-          </a:fillRef>
-          <a:effectRef idx="0">
-            <a:schemeClr val="accent1"/>
-          </a:effectRef>
-          <a:fontRef idx="minor">
-            <a:schemeClr val="lt1"/>
-          </a:fontRef>
-        </p:style>
-        <p:txBody>
-          <a:bodyPr rtlCol="0" anchor="ctr"/>
-          <a:lstStyle/>
-          <a:p>
-            <a:pPr algn="ctr"/>
-            <a:endParaRPr lang="en-US"/>
-          </a:p>
-        </p:txBody>
-      </p:sp>
-      <p:sp>
-        <p:nvSpPr>
-          <p:cNvPr id="79" name="CuadroTexto 78">
-            <a:extLst>
-              <a:ext uri="{FF2B5EF4-FFF2-40B4-BE49-F238E27FC236}">
-                <a16:creationId xmlns:a16="http://schemas.microsoft.com/office/drawing/2014/main" id="{F2560132-7B31-4CE1-AFAD-6F45DDB5E966}"/>
-              </a:ext>
-            </a:extLst>
-          </p:cNvPr>
-          <p:cNvSpPr txBox="1"/>
-          <p:nvPr/>
-        </p:nvSpPr>
-        <p:spPr>
-          <a:xfrm>
-            <a:off x="1390135" y="4921628"/>
-            <a:ext cx="1710147" cy="584775"/>
-          </a:xfrm>
-          <a:prstGeom prst="rect">
-            <a:avLst/>
-          </a:prstGeom>
-          <a:noFill/>
-        </p:spPr>
-        <p:txBody>
-          <a:bodyPr wrap="none" rtlCol="0">
-            <a:spAutoFit/>
-          </a:bodyPr>
-          <a:lstStyle/>
-          <a:p>
-            <a:pPr algn="ctr"/>
-            <a:r>
-              <a:rPr lang="en-US" sz="1600" b="1" dirty="0">
-                <a:solidFill>
-                  <a:schemeClr val="accent1">
-                    <a:lumMod val="50000"/>
-                  </a:schemeClr>
-                </a:solidFill>
-              </a:rPr>
-              <a:t>COLLABORATOR 2</a:t>
-            </a:r>
-          </a:p>
-          <a:p>
-            <a:pPr algn="ctr"/>
-            <a:r>
-              <a:rPr lang="en-US" sz="1600" b="1" dirty="0">
-                <a:solidFill>
-                  <a:schemeClr val="accent1">
-                    <a:lumMod val="50000"/>
-                  </a:schemeClr>
-                </a:solidFill>
-              </a:rPr>
-              <a:t>LOCAL</a:t>
-            </a:r>
-          </a:p>
-        </p:txBody>
-      </p:sp>
-      <p:sp>
-        <p:nvSpPr>
-          <p:cNvPr id="80" name="CuadroTexto 79">
-            <a:extLst>
-              <a:ext uri="{FF2B5EF4-FFF2-40B4-BE49-F238E27FC236}">
-                <a16:creationId xmlns:a16="http://schemas.microsoft.com/office/drawing/2014/main" id="{E011076B-DD6C-45D0-AAE5-064F3E68A8AF}"/>
-              </a:ext>
-            </a:extLst>
-          </p:cNvPr>
-          <p:cNvSpPr txBox="1"/>
-          <p:nvPr/>
-        </p:nvSpPr>
-        <p:spPr>
-          <a:xfrm>
-            <a:off x="1390135" y="1041653"/>
-            <a:ext cx="1710147" cy="584775"/>
-          </a:xfrm>
-          <a:prstGeom prst="rect">
-            <a:avLst/>
-          </a:prstGeom>
-          <a:noFill/>
-        </p:spPr>
-        <p:txBody>
-          <a:bodyPr wrap="none" rtlCol="0">
-            <a:spAutoFit/>
-          </a:bodyPr>
-          <a:lstStyle/>
-          <a:p>
-            <a:pPr algn="ctr"/>
-            <a:r>
-              <a:rPr lang="en-US" sz="1600" b="1" dirty="0"/>
-              <a:t>COLLABORATOR 1</a:t>
-            </a:r>
-          </a:p>
-          <a:p>
-            <a:pPr algn="ctr"/>
-            <a:r>
-              <a:rPr lang="en-US" sz="1600" b="1" dirty="0"/>
-              <a:t>LOCAL</a:t>
-            </a:r>
-          </a:p>
-        </p:txBody>
-      </p:sp>
-      <p:sp>
-        <p:nvSpPr>
-          <p:cNvPr id="82" name="Rectángulo 81">
-            <a:extLst>
-              <a:ext uri="{FF2B5EF4-FFF2-40B4-BE49-F238E27FC236}">
-                <a16:creationId xmlns:a16="http://schemas.microsoft.com/office/drawing/2014/main" id="{CDCE2A34-3BA5-4B16-B8EB-C4F6930EA1D2}"/>
-              </a:ext>
-            </a:extLst>
-          </p:cNvPr>
-          <p:cNvSpPr/>
-          <p:nvPr/>
-        </p:nvSpPr>
-        <p:spPr>
-          <a:xfrm>
-            <a:off x="6203834" y="3212961"/>
-            <a:ext cx="914400" cy="914400"/>
-          </a:xfrm>
-          <a:prstGeom prst="rect">
-            <a:avLst/>
-          </a:prstGeom>
-          <a:noFill/>
-          <a:ln>
-            <a:noFill/>
-          </a:ln>
-        </p:spPr>
-        <p:style>
-          <a:lnRef idx="2">
-            <a:schemeClr val="accent1">
-              <a:shade val="50000"/>
-            </a:schemeClr>
-          </a:lnRef>
-          <a:fillRef idx="1">
-            <a:schemeClr val="accent1"/>
-          </a:fillRef>
-          <a:effectRef idx="0">
-            <a:schemeClr val="accent1"/>
-          </a:effectRef>
-          <a:fontRef idx="minor">
-            <a:schemeClr val="lt1"/>
-          </a:fontRef>
-        </p:style>
-        <p:txBody>
-          <a:bodyPr rtlCol="0" anchor="ctr"/>
-          <a:lstStyle/>
-          <a:p>
-            <a:pPr algn="ctr"/>
-            <a:endParaRPr lang="en-US"/>
-          </a:p>
-        </p:txBody>
-      </p:sp>
-      <p:cxnSp>
-        <p:nvCxnSpPr>
-          <p:cNvPr id="86" name="Conector: angular 85">
-            <a:extLst>
-              <a:ext uri="{FF2B5EF4-FFF2-40B4-BE49-F238E27FC236}">
-                <a16:creationId xmlns:a16="http://schemas.microsoft.com/office/drawing/2014/main" id="{D8C190D0-6B3D-4DC3-868A-1FCCC55B5BCA}"/>
-              </a:ext>
-            </a:extLst>
-          </p:cNvPr>
-          <p:cNvCxnSpPr>
-            <a:cxnSpLocks/>
-            <a:stCxn id="82" idx="2"/>
-            <a:endCxn id="11" idx="0"/>
-          </p:cNvCxnSpPr>
-          <p:nvPr/>
-        </p:nvCxnSpPr>
-        <p:spPr>
-          <a:xfrm flipV="1">
-            <a:off x="6661034" y="3238298"/>
-            <a:ext cx="2178" cy="889063"/>
-          </a:xfrm>
-          <a:prstGeom prst="straightConnector1">
-            <a:avLst/>
-          </a:prstGeom>
-          <a:ln w="25400">
-            <a:solidFill>
-              <a:schemeClr val="tx1"/>
-            </a:solidFill>
-            <a:tailEnd type="arrow" w="med" len="lg"/>
-          </a:ln>
-        </p:spPr>
-        <p:style>
-          <a:lnRef idx="1">
-            <a:schemeClr val="accent1"/>
-          </a:lnRef>
-          <a:fillRef idx="0">
-            <a:schemeClr val="accent1"/>
-          </a:fillRef>
-          <a:effectRef idx="0">
-            <a:schemeClr val="accent1"/>
-          </a:effectRef>
-          <a:fontRef idx="minor">
-            <a:schemeClr val="tx1"/>
-          </a:fontRef>
-        </p:style>
-      </p:cxnSp>
-      <p:sp>
-        <p:nvSpPr>
-          <p:cNvPr id="89" name="CuadroTexto 88">
-            <a:extLst>
-              <a:ext uri="{FF2B5EF4-FFF2-40B4-BE49-F238E27FC236}">
-                <a16:creationId xmlns:a16="http://schemas.microsoft.com/office/drawing/2014/main" id="{868C342D-C233-44BD-8ABC-51658779AD68}"/>
-              </a:ext>
-            </a:extLst>
-          </p:cNvPr>
-          <p:cNvSpPr txBox="1"/>
-          <p:nvPr/>
-        </p:nvSpPr>
-        <p:spPr>
-          <a:xfrm>
-            <a:off x="5570439" y="4064402"/>
-            <a:ext cx="1051122" cy="276999"/>
-          </a:xfrm>
-          <a:prstGeom prst="rect">
-            <a:avLst/>
-          </a:prstGeom>
-          <a:noFill/>
-        </p:spPr>
-        <p:txBody>
-          <a:bodyPr wrap="none" rtlCol="0">
-            <a:spAutoFit/>
-          </a:bodyPr>
-          <a:lstStyle/>
-          <a:p>
-            <a:r>
-              <a:rPr lang="en-US" sz="1200" b="1" dirty="0">
-                <a:solidFill>
-                  <a:schemeClr val="accent1">
-                    <a:lumMod val="50000"/>
-                  </a:schemeClr>
-                </a:solidFill>
-              </a:rPr>
-              <a:t>PULL Request</a:t>
-            </a:r>
-          </a:p>
-        </p:txBody>
-      </p:sp>
-      <p:sp>
-        <p:nvSpPr>
-          <p:cNvPr id="90" name="Rectángulo 89">
-            <a:extLst>
-              <a:ext uri="{FF2B5EF4-FFF2-40B4-BE49-F238E27FC236}">
-                <a16:creationId xmlns:a16="http://schemas.microsoft.com/office/drawing/2014/main" id="{4B7FFECA-BEA9-4149-8ABB-C7920C619ED9}"/>
-              </a:ext>
-            </a:extLst>
-          </p:cNvPr>
-          <p:cNvSpPr/>
-          <p:nvPr/>
-        </p:nvSpPr>
-        <p:spPr>
-          <a:xfrm>
-            <a:off x="7037684" y="2305832"/>
-            <a:ext cx="914400" cy="914400"/>
-          </a:xfrm>
-          <a:prstGeom prst="rect">
-            <a:avLst/>
-          </a:prstGeom>
-          <a:noFill/>
-          <a:ln>
-            <a:noFill/>
-          </a:ln>
-        </p:spPr>
-        <p:style>
-          <a:lnRef idx="2">
-            <a:schemeClr val="accent1">
-              <a:shade val="50000"/>
-            </a:schemeClr>
-          </a:lnRef>
-          <a:fillRef idx="1">
-            <a:schemeClr val="accent1"/>
-          </a:fillRef>
-          <a:effectRef idx="0">
-            <a:schemeClr val="accent1"/>
-          </a:effectRef>
-          <a:fontRef idx="minor">
-            <a:schemeClr val="lt1"/>
-          </a:fontRef>
-        </p:style>
-        <p:txBody>
-          <a:bodyPr rtlCol="0" anchor="ctr"/>
-          <a:lstStyle/>
-          <a:p>
-            <a:pPr algn="ctr"/>
-            <a:endParaRPr lang="en-US"/>
-          </a:p>
-        </p:txBody>
-      </p:sp>
-      <p:cxnSp>
-        <p:nvCxnSpPr>
-          <p:cNvPr id="97" name="Conector: angular 85">
-            <a:extLst>
-              <a:ext uri="{FF2B5EF4-FFF2-40B4-BE49-F238E27FC236}">
-                <a16:creationId xmlns:a16="http://schemas.microsoft.com/office/drawing/2014/main" id="{8005C341-7927-4EF5-BF6C-154AF4DB0F82}"/>
-              </a:ext>
-            </a:extLst>
-          </p:cNvPr>
-          <p:cNvCxnSpPr>
-            <a:cxnSpLocks/>
-            <a:stCxn id="90" idx="0"/>
-            <a:endCxn id="90" idx="2"/>
-          </p:cNvCxnSpPr>
-          <p:nvPr/>
-        </p:nvCxnSpPr>
-        <p:spPr>
-          <a:xfrm>
-            <a:off x="7494884" y="2305832"/>
-            <a:ext cx="0" cy="914400"/>
-          </a:xfrm>
-          <a:prstGeom prst="straightConnector1">
-            <a:avLst/>
-          </a:prstGeom>
-          <a:ln w="25400">
-            <a:solidFill>
-              <a:schemeClr val="tx1"/>
-            </a:solidFill>
-            <a:tailEnd type="arrow" w="med" len="lg"/>
-          </a:ln>
-        </p:spPr>
-        <p:style>
-          <a:lnRef idx="1">
-            <a:schemeClr val="accent1"/>
-          </a:lnRef>
-          <a:fillRef idx="0">
-            <a:schemeClr val="accent1"/>
-          </a:fillRef>
-          <a:effectRef idx="0">
-            <a:schemeClr val="accent1"/>
-          </a:effectRef>
-          <a:fontRef idx="minor">
-            <a:schemeClr val="tx1"/>
-          </a:fontRef>
-        </p:style>
-      </p:cxnSp>
-      <p:sp>
-        <p:nvSpPr>
-          <p:cNvPr id="100" name="CuadroTexto 99">
-            <a:extLst>
-              <a:ext uri="{FF2B5EF4-FFF2-40B4-BE49-F238E27FC236}">
-                <a16:creationId xmlns:a16="http://schemas.microsoft.com/office/drawing/2014/main" id="{A2B40A4D-46EA-4A0F-B47F-AF0A9FE8F2EF}"/>
-              </a:ext>
-            </a:extLst>
-          </p:cNvPr>
-          <p:cNvSpPr txBox="1"/>
-          <p:nvPr/>
-        </p:nvSpPr>
-        <p:spPr>
-          <a:xfrm>
-            <a:off x="7517549" y="2026113"/>
-            <a:ext cx="1051122" cy="276999"/>
-          </a:xfrm>
-          <a:prstGeom prst="rect">
-            <a:avLst/>
-          </a:prstGeom>
-          <a:noFill/>
-        </p:spPr>
-        <p:txBody>
-          <a:bodyPr wrap="none" rtlCol="0">
-            <a:spAutoFit/>
-          </a:bodyPr>
-          <a:lstStyle/>
-          <a:p>
-            <a:r>
-              <a:rPr lang="en-US" sz="1200" b="1" dirty="0"/>
-              <a:t>PULL Request</a:t>
-            </a:r>
-          </a:p>
-        </p:txBody>
-      </p:sp>
-      <p:cxnSp>
-        <p:nvCxnSpPr>
-          <p:cNvPr id="101" name="Conector recto 100">
-            <a:extLst>
-              <a:ext uri="{FF2B5EF4-FFF2-40B4-BE49-F238E27FC236}">
-                <a16:creationId xmlns:a16="http://schemas.microsoft.com/office/drawing/2014/main" id="{05F2E648-1E94-44BE-B459-10438912BD9D}"/>
-              </a:ext>
-            </a:extLst>
-          </p:cNvPr>
-          <p:cNvCxnSpPr>
-            <a:cxnSpLocks/>
-            <a:stCxn id="10" idx="1"/>
-            <a:endCxn id="10" idx="3"/>
-          </p:cNvCxnSpPr>
-          <p:nvPr/>
-        </p:nvCxnSpPr>
-        <p:spPr>
-          <a:xfrm>
-            <a:off x="1392571" y="1921153"/>
-            <a:ext cx="10541282" cy="0"/>
+          <a:xfrm>
+            <a:off x="1392571" y="4552723"/>
+            <a:ext cx="10516057" cy="0"/>
           </a:xfrm>
           <a:prstGeom prst="line">
             <a:avLst/>
           </a:prstGeom>
           <a:ln w="31750">
             <a:solidFill>
-              <a:schemeClr val="tx1"/>
+              <a:schemeClr val="accent2"/>
             </a:solidFill>
             <a:prstDash val="dash"/>
           </a:ln>
@@ -6135,33 +5164,31 @@
       </p:cxnSp>
       <p:cxnSp>
         <p:nvCxnSpPr>
-          <p:cNvPr id="105" name="Conector recto 104">
-            <a:extLst>
-              <a:ext uri="{FF2B5EF4-FFF2-40B4-BE49-F238E27FC236}">
-                <a16:creationId xmlns:a16="http://schemas.microsoft.com/office/drawing/2014/main" id="{B019CD6C-E857-414A-BCB7-968FC0B619DA}"/>
+          <p:cNvPr id="101" name="Conector recto 100">
+            <a:extLst>
+              <a:ext uri="{FF2B5EF4-FFF2-40B4-BE49-F238E27FC236}">
+                <a16:creationId xmlns:a16="http://schemas.microsoft.com/office/drawing/2014/main" id="{05F2E648-1E94-44BE-B459-10438912BD9D}"/>
               </a:ext>
             </a:extLst>
           </p:cNvPr>
           <p:cNvCxnSpPr>
             <a:cxnSpLocks/>
-            <a:stCxn id="11" idx="1"/>
-            <a:endCxn id="11" idx="3"/>
+            <a:stCxn id="10" idx="1"/>
+            <a:endCxn id="10" idx="3"/>
           </p:cNvCxnSpPr>
           <p:nvPr/>
         </p:nvCxnSpPr>
         <p:spPr>
           <a:xfrm>
-            <a:off x="1392571" y="4555443"/>
-            <a:ext cx="10541282" cy="0"/>
+            <a:off x="1392571" y="1921153"/>
+            <a:ext cx="10516059" cy="0"/>
           </a:xfrm>
           <a:prstGeom prst="line">
             <a:avLst/>
           </a:prstGeom>
           <a:ln w="31750">
             <a:solidFill>
-              <a:schemeClr val="accent1">
-                <a:lumMod val="50000"/>
-              </a:schemeClr>
+              <a:schemeClr val="accent6"/>
             </a:solidFill>
             <a:prstDash val="dash"/>
           </a:ln>
@@ -6183,122 +5210,10 @@
       </p:cxnSp>
       <p:sp>
         <p:nvSpPr>
-          <p:cNvPr id="108" name="CuadroTexto 107">
-            <a:extLst>
-              <a:ext uri="{FF2B5EF4-FFF2-40B4-BE49-F238E27FC236}">
-                <a16:creationId xmlns:a16="http://schemas.microsoft.com/office/drawing/2014/main" id="{A8AE0DA7-DFD0-42F2-A63F-DE2B3010F0AC}"/>
-              </a:ext>
-            </a:extLst>
-          </p:cNvPr>
-          <p:cNvSpPr txBox="1"/>
-          <p:nvPr/>
-        </p:nvSpPr>
-        <p:spPr>
-          <a:xfrm>
-            <a:off x="5485753" y="5061036"/>
-            <a:ext cx="1436162" cy="461665"/>
-          </a:xfrm>
-          <a:prstGeom prst="rect">
-            <a:avLst/>
-          </a:prstGeom>
-          <a:noFill/>
-        </p:spPr>
-        <p:txBody>
-          <a:bodyPr wrap="none" rtlCol="0">
-            <a:spAutoFit/>
-          </a:bodyPr>
-          <a:lstStyle/>
-          <a:p>
-            <a:pPr algn="ctr"/>
-            <a:r>
-              <a:rPr lang="en-US" sz="1200" b="1" dirty="0" err="1">
-                <a:solidFill>
-                  <a:schemeClr val="accent1">
-                    <a:lumMod val="50000"/>
-                  </a:schemeClr>
-                </a:solidFill>
-              </a:rPr>
-              <a:t>TaskA</a:t>
-            </a:r>
-            <a:r>
-              <a:rPr lang="en-US" sz="1200" b="1" dirty="0">
-                <a:solidFill>
-                  <a:schemeClr val="accent1">
-                    <a:lumMod val="50000"/>
-                  </a:schemeClr>
-                </a:solidFill>
-              </a:rPr>
-              <a:t> Finished and </a:t>
-            </a:r>
-          </a:p>
-          <a:p>
-            <a:pPr algn="ctr"/>
-            <a:r>
-              <a:rPr lang="en-US" sz="1200" b="1" dirty="0">
-                <a:solidFill>
-                  <a:schemeClr val="accent1">
-                    <a:lumMod val="50000"/>
-                  </a:schemeClr>
-                </a:solidFill>
-              </a:rPr>
-              <a:t>working properly</a:t>
-            </a:r>
-          </a:p>
-        </p:txBody>
-      </p:sp>
-      <p:sp>
-        <p:nvSpPr>
-          <p:cNvPr id="109" name="CuadroTexto 108">
-            <a:extLst>
-              <a:ext uri="{FF2B5EF4-FFF2-40B4-BE49-F238E27FC236}">
-                <a16:creationId xmlns:a16="http://schemas.microsoft.com/office/drawing/2014/main" id="{7D3C2D0D-A1B7-40F9-A1E5-05E64EFAAC9C}"/>
-              </a:ext>
-            </a:extLst>
-          </p:cNvPr>
-          <p:cNvSpPr txBox="1"/>
-          <p:nvPr/>
-        </p:nvSpPr>
-        <p:spPr>
-          <a:xfrm>
-            <a:off x="6636435" y="954762"/>
-            <a:ext cx="1429750" cy="461665"/>
-          </a:xfrm>
-          <a:prstGeom prst="rect">
-            <a:avLst/>
-          </a:prstGeom>
-          <a:noFill/>
-        </p:spPr>
-        <p:txBody>
-          <a:bodyPr wrap="none" rtlCol="0">
-            <a:spAutoFit/>
-          </a:bodyPr>
-          <a:lstStyle/>
-          <a:p>
-            <a:pPr algn="ctr"/>
-            <a:r>
-              <a:rPr lang="en-US" sz="1200" b="1" dirty="0" err="1"/>
-              <a:t>TaskB</a:t>
-            </a:r>
-            <a:r>
-              <a:rPr lang="en-US" sz="1200" b="1" dirty="0"/>
-              <a:t> Finished and </a:t>
-            </a:r>
-          </a:p>
-          <a:p>
-            <a:pPr algn="ctr"/>
-            <a:r>
-              <a:rPr lang="en-US" sz="1200" b="1" dirty="0"/>
-              <a:t>working properly</a:t>
-            </a:r>
-          </a:p>
-        </p:txBody>
-      </p:sp>
-      <p:sp>
-        <p:nvSpPr>
-          <p:cNvPr id="120" name="Rectángulo 119">
-            <a:extLst>
-              <a:ext uri="{FF2B5EF4-FFF2-40B4-BE49-F238E27FC236}">
-                <a16:creationId xmlns:a16="http://schemas.microsoft.com/office/drawing/2014/main" id="{87A56CD0-E7BA-4E92-9A6E-DD859C36A43F}"/>
+          <p:cNvPr id="10" name="Rectángulo 9">
+            <a:extLst>
+              <a:ext uri="{FF2B5EF4-FFF2-40B4-BE49-F238E27FC236}">
+                <a16:creationId xmlns:a16="http://schemas.microsoft.com/office/drawing/2014/main" id="{119579E0-D158-4F77-94AE-0232247F8A8B}"/>
               </a:ext>
             </a:extLst>
           </p:cNvPr>
@@ -6307,15 +5222,17 @@
         </p:nvSpPr>
         <p:spPr>
           <a:xfrm>
-            <a:off x="8227314" y="4546163"/>
-            <a:ext cx="1080071" cy="960239"/>
+            <a:off x="1392571" y="604008"/>
+            <a:ext cx="10516059" cy="2634290"/>
           </a:xfrm>
           <a:prstGeom prst="rect">
             <a:avLst/>
           </a:prstGeom>
           <a:noFill/>
-          <a:ln>
-            <a:noFill/>
+          <a:ln w="38100">
+            <a:solidFill>
+              <a:schemeClr val="accent6"/>
+            </a:solidFill>
           </a:ln>
         </p:spPr>
         <p:style>
@@ -6339,6 +5256,1062 @@
           <a:lstStyle/>
           <a:p>
             <a:pPr algn="ctr"/>
+            <a:endParaRPr lang="en-US"/>
+          </a:p>
+        </p:txBody>
+      </p:sp>
+      <p:sp>
+        <p:nvSpPr>
+          <p:cNvPr id="11" name="Rectángulo 10">
+            <a:extLst>
+              <a:ext uri="{FF2B5EF4-FFF2-40B4-BE49-F238E27FC236}">
+                <a16:creationId xmlns:a16="http://schemas.microsoft.com/office/drawing/2014/main" id="{9895E96B-0347-41FB-999B-4ED4437414D9}"/>
+              </a:ext>
+            </a:extLst>
+          </p:cNvPr>
+          <p:cNvSpPr/>
+          <p:nvPr/>
+        </p:nvSpPr>
+        <p:spPr>
+          <a:xfrm>
+            <a:off x="1392571" y="3232858"/>
+            <a:ext cx="10516057" cy="2639730"/>
+          </a:xfrm>
+          <a:prstGeom prst="rect">
+            <a:avLst/>
+          </a:prstGeom>
+          <a:noFill/>
+          <a:ln w="38100">
+            <a:solidFill>
+              <a:schemeClr val="accent2"/>
+            </a:solidFill>
+          </a:ln>
+        </p:spPr>
+        <p:style>
+          <a:lnRef idx="2">
+            <a:schemeClr val="accent1">
+              <a:shade val="50000"/>
+            </a:schemeClr>
+          </a:lnRef>
+          <a:fillRef idx="1">
+            <a:schemeClr val="accent1"/>
+          </a:fillRef>
+          <a:effectRef idx="0">
+            <a:schemeClr val="accent1"/>
+          </a:effectRef>
+          <a:fontRef idx="minor">
+            <a:schemeClr val="lt1"/>
+          </a:fontRef>
+        </p:style>
+        <p:txBody>
+          <a:bodyPr rtlCol="0" anchor="ctr"/>
+          <a:lstStyle/>
+          <a:p>
+            <a:pPr algn="ctr"/>
+            <a:endParaRPr lang="en-US" dirty="0"/>
+          </a:p>
+        </p:txBody>
+      </p:sp>
+      <p:cxnSp>
+        <p:nvCxnSpPr>
+          <p:cNvPr id="2" name="Conector recto de flecha 1">
+            <a:extLst>
+              <a:ext uri="{FF2B5EF4-FFF2-40B4-BE49-F238E27FC236}">
+                <a16:creationId xmlns:a16="http://schemas.microsoft.com/office/drawing/2014/main" id="{55CC1AF4-7FC0-42DF-9794-320442F4BFA5}"/>
+              </a:ext>
+            </a:extLst>
+          </p:cNvPr>
+          <p:cNvCxnSpPr>
+            <a:cxnSpLocks/>
+          </p:cNvCxnSpPr>
+          <p:nvPr/>
+        </p:nvCxnSpPr>
+        <p:spPr>
+          <a:xfrm flipV="1">
+            <a:off x="1392571" y="3232858"/>
+            <a:ext cx="8581853" cy="5440"/>
+          </a:xfrm>
+          <a:prstGeom prst="straightConnector1">
+            <a:avLst/>
+          </a:prstGeom>
+          <a:ln w="63500">
+            <a:solidFill>
+              <a:schemeClr val="tx1"/>
+            </a:solidFill>
+            <a:headEnd type="none"/>
+            <a:tailEnd type="arrow" w="med" len="lg"/>
+          </a:ln>
+        </p:spPr>
+        <p:style>
+          <a:lnRef idx="1">
+            <a:schemeClr val="accent1"/>
+          </a:lnRef>
+          <a:fillRef idx="0">
+            <a:schemeClr val="accent1"/>
+          </a:fillRef>
+          <a:effectRef idx="0">
+            <a:schemeClr val="accent1"/>
+          </a:effectRef>
+          <a:fontRef idx="minor">
+            <a:schemeClr val="tx1"/>
+          </a:fontRef>
+        </p:style>
+      </p:cxnSp>
+      <p:sp>
+        <p:nvSpPr>
+          <p:cNvPr id="5" name="CuadroTexto 4">
+            <a:extLst>
+              <a:ext uri="{FF2B5EF4-FFF2-40B4-BE49-F238E27FC236}">
+                <a16:creationId xmlns:a16="http://schemas.microsoft.com/office/drawing/2014/main" id="{78E68BE9-6066-499F-86AA-6CA10930D7F5}"/>
+              </a:ext>
+            </a:extLst>
+          </p:cNvPr>
+          <p:cNvSpPr txBox="1"/>
+          <p:nvPr/>
+        </p:nvSpPr>
+        <p:spPr>
+          <a:xfrm>
+            <a:off x="1369575" y="2226155"/>
+            <a:ext cx="2087495" cy="707886"/>
+          </a:xfrm>
+          <a:prstGeom prst="rect">
+            <a:avLst/>
+          </a:prstGeom>
+          <a:noFill/>
+        </p:spPr>
+        <p:txBody>
+          <a:bodyPr wrap="none" rtlCol="0">
+            <a:spAutoFit/>
+          </a:bodyPr>
+          <a:lstStyle/>
+          <a:p>
+            <a:pPr algn="ctr"/>
+            <a:r>
+              <a:rPr lang="en-US" sz="2000" b="1" dirty="0">
+                <a:solidFill>
+                  <a:schemeClr val="accent6"/>
+                </a:solidFill>
+              </a:rPr>
+              <a:t>COLLABORATOR 1</a:t>
+            </a:r>
+          </a:p>
+          <a:p>
+            <a:pPr algn="ctr"/>
+            <a:r>
+              <a:rPr lang="en-US" sz="2000" b="1" dirty="0">
+                <a:solidFill>
+                  <a:schemeClr val="accent6"/>
+                </a:solidFill>
+              </a:rPr>
+              <a:t>REMOTE</a:t>
+            </a:r>
+          </a:p>
+        </p:txBody>
+      </p:sp>
+      <p:sp>
+        <p:nvSpPr>
+          <p:cNvPr id="9" name="CuadroTexto 8">
+            <a:extLst>
+              <a:ext uri="{FF2B5EF4-FFF2-40B4-BE49-F238E27FC236}">
+                <a16:creationId xmlns:a16="http://schemas.microsoft.com/office/drawing/2014/main" id="{A0516147-A43F-494B-968F-6AFECB012FBC}"/>
+              </a:ext>
+            </a:extLst>
+          </p:cNvPr>
+          <p:cNvSpPr txBox="1"/>
+          <p:nvPr/>
+        </p:nvSpPr>
+        <p:spPr>
+          <a:xfrm>
+            <a:off x="1327300" y="3605264"/>
+            <a:ext cx="2087495" cy="707886"/>
+          </a:xfrm>
+          <a:prstGeom prst="rect">
+            <a:avLst/>
+          </a:prstGeom>
+          <a:noFill/>
+        </p:spPr>
+        <p:txBody>
+          <a:bodyPr wrap="none" rtlCol="0">
+            <a:spAutoFit/>
+          </a:bodyPr>
+          <a:lstStyle/>
+          <a:p>
+            <a:pPr algn="ctr"/>
+            <a:r>
+              <a:rPr lang="en-US" sz="2000" b="1" dirty="0">
+                <a:solidFill>
+                  <a:schemeClr val="accent2"/>
+                </a:solidFill>
+              </a:rPr>
+              <a:t>COLLABORATOR 2</a:t>
+            </a:r>
+          </a:p>
+          <a:p>
+            <a:pPr algn="ctr"/>
+            <a:r>
+              <a:rPr lang="en-US" sz="2000" b="1" dirty="0">
+                <a:solidFill>
+                  <a:schemeClr val="accent2"/>
+                </a:solidFill>
+              </a:rPr>
+              <a:t>REMOTE</a:t>
+            </a:r>
+          </a:p>
+        </p:txBody>
+      </p:sp>
+      <p:cxnSp>
+        <p:nvCxnSpPr>
+          <p:cNvPr id="19" name="Conector: angular 18">
+            <a:extLst>
+              <a:ext uri="{FF2B5EF4-FFF2-40B4-BE49-F238E27FC236}">
+                <a16:creationId xmlns:a16="http://schemas.microsoft.com/office/drawing/2014/main" id="{AFD1E0CF-EC68-434F-A7FD-89009CCE9FB6}"/>
+              </a:ext>
+            </a:extLst>
+          </p:cNvPr>
+          <p:cNvCxnSpPr>
+            <a:cxnSpLocks/>
+            <a:endCxn id="82" idx="2"/>
+          </p:cNvCxnSpPr>
+          <p:nvPr/>
+        </p:nvCxnSpPr>
+        <p:spPr>
+          <a:xfrm>
+            <a:off x="3517641" y="3232858"/>
+            <a:ext cx="3143393" cy="894503"/>
+          </a:xfrm>
+          <a:prstGeom prst="bentConnector4">
+            <a:avLst>
+              <a:gd name="adj1" fmla="val 3"/>
+              <a:gd name="adj2" fmla="val 201159"/>
+            </a:avLst>
+          </a:prstGeom>
+          <a:ln w="25400">
+            <a:solidFill>
+              <a:schemeClr val="tx1"/>
+            </a:solidFill>
+            <a:tailEnd type="arrow" w="med" len="lg"/>
+          </a:ln>
+        </p:spPr>
+        <p:style>
+          <a:lnRef idx="1">
+            <a:schemeClr val="accent1"/>
+          </a:lnRef>
+          <a:fillRef idx="0">
+            <a:schemeClr val="accent1"/>
+          </a:fillRef>
+          <a:effectRef idx="0">
+            <a:schemeClr val="accent1"/>
+          </a:effectRef>
+          <a:fontRef idx="minor">
+            <a:schemeClr val="tx1"/>
+          </a:fontRef>
+        </p:style>
+      </p:cxnSp>
+      <p:sp>
+        <p:nvSpPr>
+          <p:cNvPr id="28" name="CuadroTexto 27">
+            <a:extLst>
+              <a:ext uri="{FF2B5EF4-FFF2-40B4-BE49-F238E27FC236}">
+                <a16:creationId xmlns:a16="http://schemas.microsoft.com/office/drawing/2014/main" id="{E7D338A0-9D69-4B2A-BC05-293E926B85F1}"/>
+              </a:ext>
+            </a:extLst>
+          </p:cNvPr>
+          <p:cNvSpPr txBox="1"/>
+          <p:nvPr/>
+        </p:nvSpPr>
+        <p:spPr>
+          <a:xfrm>
+            <a:off x="9960068" y="3028295"/>
+            <a:ext cx="1947533" cy="369332"/>
+          </a:xfrm>
+          <a:prstGeom prst="rect">
+            <a:avLst/>
+          </a:prstGeom>
+          <a:solidFill>
+            <a:schemeClr val="bg1"/>
+          </a:solidFill>
+          <a:ln w="38100">
+            <a:solidFill>
+              <a:schemeClr val="tx1"/>
+            </a:solidFill>
+          </a:ln>
+        </p:spPr>
+        <p:txBody>
+          <a:bodyPr wrap="square" rtlCol="0">
+            <a:spAutoFit/>
+          </a:bodyPr>
+          <a:lstStyle/>
+          <a:p>
+            <a:pPr algn="ctr"/>
+            <a:r>
+              <a:rPr lang="en-US" b="1" dirty="0"/>
+              <a:t>MASTER BRANCH</a:t>
+            </a:r>
+          </a:p>
+        </p:txBody>
+      </p:sp>
+      <p:cxnSp>
+        <p:nvCxnSpPr>
+          <p:cNvPr id="63" name="Conector: angular 62">
+            <a:extLst>
+              <a:ext uri="{FF2B5EF4-FFF2-40B4-BE49-F238E27FC236}">
+                <a16:creationId xmlns:a16="http://schemas.microsoft.com/office/drawing/2014/main" id="{1B92616A-C6FC-4707-8E4A-F6E15845C2F3}"/>
+              </a:ext>
+            </a:extLst>
+          </p:cNvPr>
+          <p:cNvCxnSpPr>
+            <a:cxnSpLocks/>
+            <a:endCxn id="90" idx="0"/>
+          </p:cNvCxnSpPr>
+          <p:nvPr/>
+        </p:nvCxnSpPr>
+        <p:spPr>
+          <a:xfrm flipV="1">
+            <a:off x="4349313" y="2305832"/>
+            <a:ext cx="3145571" cy="937906"/>
+          </a:xfrm>
+          <a:prstGeom prst="bentConnector4">
+            <a:avLst>
+              <a:gd name="adj1" fmla="val 340"/>
+              <a:gd name="adj2" fmla="val 191400"/>
+            </a:avLst>
+          </a:prstGeom>
+          <a:ln w="25400">
+            <a:solidFill>
+              <a:schemeClr val="tx1"/>
+            </a:solidFill>
+            <a:tailEnd type="arrow" w="med" len="lg"/>
+          </a:ln>
+        </p:spPr>
+        <p:style>
+          <a:lnRef idx="1">
+            <a:schemeClr val="accent1"/>
+          </a:lnRef>
+          <a:fillRef idx="0">
+            <a:schemeClr val="accent1"/>
+          </a:fillRef>
+          <a:effectRef idx="0">
+            <a:schemeClr val="accent1"/>
+          </a:effectRef>
+          <a:fontRef idx="minor">
+            <a:schemeClr val="tx1"/>
+          </a:fontRef>
+        </p:style>
+      </p:cxnSp>
+      <p:sp>
+        <p:nvSpPr>
+          <p:cNvPr id="67" name="CuadroTexto 66">
+            <a:extLst>
+              <a:ext uri="{FF2B5EF4-FFF2-40B4-BE49-F238E27FC236}">
+                <a16:creationId xmlns:a16="http://schemas.microsoft.com/office/drawing/2014/main" id="{DD5AF870-9674-447A-A164-4F1782F517BA}"/>
+              </a:ext>
+            </a:extLst>
+          </p:cNvPr>
+          <p:cNvSpPr txBox="1"/>
+          <p:nvPr/>
+        </p:nvSpPr>
+        <p:spPr>
+          <a:xfrm>
+            <a:off x="3405592" y="5070899"/>
+            <a:ext cx="1371722" cy="338554"/>
+          </a:xfrm>
+          <a:prstGeom prst="rect">
+            <a:avLst/>
+          </a:prstGeom>
+          <a:noFill/>
+        </p:spPr>
+        <p:txBody>
+          <a:bodyPr wrap="none" rtlCol="0">
+            <a:spAutoFit/>
+          </a:bodyPr>
+          <a:lstStyle/>
+          <a:p>
+            <a:pPr algn="ctr"/>
+            <a:r>
+              <a:rPr lang="en-US" sz="1600" b="1" dirty="0" err="1">
+                <a:solidFill>
+                  <a:schemeClr val="accent2"/>
+                </a:solidFill>
+              </a:rPr>
+              <a:t>TaskA_Branch</a:t>
+            </a:r>
+            <a:endParaRPr lang="en-US" sz="1600" b="1" dirty="0">
+              <a:solidFill>
+                <a:schemeClr val="accent2"/>
+              </a:solidFill>
+            </a:endParaRPr>
+          </a:p>
+        </p:txBody>
+      </p:sp>
+      <p:sp>
+        <p:nvSpPr>
+          <p:cNvPr id="68" name="CuadroTexto 67">
+            <a:extLst>
+              <a:ext uri="{FF2B5EF4-FFF2-40B4-BE49-F238E27FC236}">
+                <a16:creationId xmlns:a16="http://schemas.microsoft.com/office/drawing/2014/main" id="{B88D6941-CA3F-433C-B3F0-5060152C7397}"/>
+              </a:ext>
+            </a:extLst>
+          </p:cNvPr>
+          <p:cNvSpPr txBox="1"/>
+          <p:nvPr/>
+        </p:nvSpPr>
+        <p:spPr>
+          <a:xfrm>
+            <a:off x="3732589" y="1105463"/>
+            <a:ext cx="1362104" cy="338554"/>
+          </a:xfrm>
+          <a:prstGeom prst="rect">
+            <a:avLst/>
+          </a:prstGeom>
+          <a:noFill/>
+        </p:spPr>
+        <p:txBody>
+          <a:bodyPr wrap="none" rtlCol="0">
+            <a:spAutoFit/>
+          </a:bodyPr>
+          <a:lstStyle/>
+          <a:p>
+            <a:pPr algn="ctr"/>
+            <a:r>
+              <a:rPr lang="en-US" sz="1600" b="1" dirty="0" err="1">
+                <a:solidFill>
+                  <a:schemeClr val="accent6"/>
+                </a:solidFill>
+              </a:rPr>
+              <a:t>TaskB_Branch</a:t>
+            </a:r>
+            <a:endParaRPr lang="en-US" sz="1600" b="1" dirty="0">
+              <a:solidFill>
+                <a:schemeClr val="accent6"/>
+              </a:solidFill>
+            </a:endParaRPr>
+          </a:p>
+        </p:txBody>
+      </p:sp>
+      <p:sp>
+        <p:nvSpPr>
+          <p:cNvPr id="75" name="CuadroTexto 74">
+            <a:extLst>
+              <a:ext uri="{FF2B5EF4-FFF2-40B4-BE49-F238E27FC236}">
+                <a16:creationId xmlns:a16="http://schemas.microsoft.com/office/drawing/2014/main" id="{74FFC284-674C-4257-9B5D-4DDBCF462D0A}"/>
+              </a:ext>
+            </a:extLst>
+          </p:cNvPr>
+          <p:cNvSpPr txBox="1"/>
+          <p:nvPr/>
+        </p:nvSpPr>
+        <p:spPr>
+          <a:xfrm>
+            <a:off x="7476372" y="2634536"/>
+            <a:ext cx="1724959" cy="584775"/>
+          </a:xfrm>
+          <a:prstGeom prst="rect">
+            <a:avLst/>
+          </a:prstGeom>
+          <a:noFill/>
+        </p:spPr>
+        <p:txBody>
+          <a:bodyPr wrap="none" rtlCol="0">
+            <a:spAutoFit/>
+          </a:bodyPr>
+          <a:lstStyle/>
+          <a:p>
+            <a:r>
+              <a:rPr lang="en-US" sz="1600" b="1" dirty="0">
+                <a:solidFill>
+                  <a:schemeClr val="accent6"/>
+                </a:solidFill>
+              </a:rPr>
+              <a:t>MERGE Branch</a:t>
+            </a:r>
+          </a:p>
+          <a:p>
+            <a:r>
+              <a:rPr lang="en-US" sz="1600" b="1" dirty="0">
+                <a:solidFill>
+                  <a:schemeClr val="accent6"/>
+                </a:solidFill>
+              </a:rPr>
+              <a:t>Conflicts to solve?</a:t>
+            </a:r>
+          </a:p>
+        </p:txBody>
+      </p:sp>
+      <p:sp>
+        <p:nvSpPr>
+          <p:cNvPr id="76" name="CuadroTexto 75">
+            <a:extLst>
+              <a:ext uri="{FF2B5EF4-FFF2-40B4-BE49-F238E27FC236}">
+                <a16:creationId xmlns:a16="http://schemas.microsoft.com/office/drawing/2014/main" id="{80607030-97D4-452E-982F-AD893FD39CCF}"/>
+              </a:ext>
+            </a:extLst>
+          </p:cNvPr>
+          <p:cNvSpPr txBox="1"/>
+          <p:nvPr/>
+        </p:nvSpPr>
+        <p:spPr>
+          <a:xfrm>
+            <a:off x="5596788" y="2912134"/>
+            <a:ext cx="1448153" cy="338554"/>
+          </a:xfrm>
+          <a:prstGeom prst="rect">
+            <a:avLst/>
+          </a:prstGeom>
+          <a:noFill/>
+        </p:spPr>
+        <p:txBody>
+          <a:bodyPr wrap="none" rtlCol="0">
+            <a:spAutoFit/>
+          </a:bodyPr>
+          <a:lstStyle/>
+          <a:p>
+            <a:r>
+              <a:rPr lang="en-US" sz="1600" b="1" dirty="0">
+                <a:solidFill>
+                  <a:schemeClr val="accent2"/>
+                </a:solidFill>
+              </a:rPr>
+              <a:t>MERGE Branch</a:t>
+            </a:r>
+          </a:p>
+        </p:txBody>
+      </p:sp>
+      <p:sp>
+        <p:nvSpPr>
+          <p:cNvPr id="79" name="CuadroTexto 78">
+            <a:extLst>
+              <a:ext uri="{FF2B5EF4-FFF2-40B4-BE49-F238E27FC236}">
+                <a16:creationId xmlns:a16="http://schemas.microsoft.com/office/drawing/2014/main" id="{F2560132-7B31-4CE1-AFAD-6F45DDB5E966}"/>
+              </a:ext>
+            </a:extLst>
+          </p:cNvPr>
+          <p:cNvSpPr txBox="1"/>
+          <p:nvPr/>
+        </p:nvSpPr>
+        <p:spPr>
+          <a:xfrm>
+            <a:off x="1367141" y="4826544"/>
+            <a:ext cx="2087495" cy="707886"/>
+          </a:xfrm>
+          <a:prstGeom prst="rect">
+            <a:avLst/>
+          </a:prstGeom>
+          <a:noFill/>
+        </p:spPr>
+        <p:txBody>
+          <a:bodyPr wrap="none" rtlCol="0">
+            <a:spAutoFit/>
+          </a:bodyPr>
+          <a:lstStyle/>
+          <a:p>
+            <a:pPr algn="ctr"/>
+            <a:r>
+              <a:rPr lang="en-US" sz="2000" b="1" dirty="0">
+                <a:solidFill>
+                  <a:schemeClr val="accent2"/>
+                </a:solidFill>
+              </a:rPr>
+              <a:t>COLLABORATOR 2</a:t>
+            </a:r>
+          </a:p>
+          <a:p>
+            <a:pPr algn="ctr"/>
+            <a:r>
+              <a:rPr lang="en-US" sz="2000" b="1" dirty="0">
+                <a:solidFill>
+                  <a:schemeClr val="accent2"/>
+                </a:solidFill>
+              </a:rPr>
+              <a:t>LOCAL</a:t>
+            </a:r>
+          </a:p>
+        </p:txBody>
+      </p:sp>
+      <p:sp>
+        <p:nvSpPr>
+          <p:cNvPr id="80" name="CuadroTexto 79">
+            <a:extLst>
+              <a:ext uri="{FF2B5EF4-FFF2-40B4-BE49-F238E27FC236}">
+                <a16:creationId xmlns:a16="http://schemas.microsoft.com/office/drawing/2014/main" id="{E011076B-DD6C-45D0-AAE5-064F3E68A8AF}"/>
+              </a:ext>
+            </a:extLst>
+          </p:cNvPr>
+          <p:cNvSpPr txBox="1"/>
+          <p:nvPr/>
+        </p:nvSpPr>
+        <p:spPr>
+          <a:xfrm>
+            <a:off x="1367141" y="946569"/>
+            <a:ext cx="2087495" cy="707886"/>
+          </a:xfrm>
+          <a:prstGeom prst="rect">
+            <a:avLst/>
+          </a:prstGeom>
+          <a:noFill/>
+        </p:spPr>
+        <p:txBody>
+          <a:bodyPr wrap="none" rtlCol="0">
+            <a:spAutoFit/>
+          </a:bodyPr>
+          <a:lstStyle/>
+          <a:p>
+            <a:pPr algn="ctr"/>
+            <a:r>
+              <a:rPr lang="en-US" sz="2000" b="1" dirty="0">
+                <a:solidFill>
+                  <a:schemeClr val="accent6"/>
+                </a:solidFill>
+              </a:rPr>
+              <a:t>COLLABORATOR 1</a:t>
+            </a:r>
+          </a:p>
+          <a:p>
+            <a:pPr algn="ctr"/>
+            <a:r>
+              <a:rPr lang="en-US" sz="2000" b="1" dirty="0">
+                <a:solidFill>
+                  <a:schemeClr val="accent6"/>
+                </a:solidFill>
+              </a:rPr>
+              <a:t>LOCAL</a:t>
+            </a:r>
+          </a:p>
+        </p:txBody>
+      </p:sp>
+      <p:sp>
+        <p:nvSpPr>
+          <p:cNvPr id="82" name="Rectángulo 81">
+            <a:extLst>
+              <a:ext uri="{FF2B5EF4-FFF2-40B4-BE49-F238E27FC236}">
+                <a16:creationId xmlns:a16="http://schemas.microsoft.com/office/drawing/2014/main" id="{CDCE2A34-3BA5-4B16-B8EB-C4F6930EA1D2}"/>
+              </a:ext>
+            </a:extLst>
+          </p:cNvPr>
+          <p:cNvSpPr/>
+          <p:nvPr/>
+        </p:nvSpPr>
+        <p:spPr>
+          <a:xfrm>
+            <a:off x="6203834" y="3212961"/>
+            <a:ext cx="914400" cy="914400"/>
+          </a:xfrm>
+          <a:prstGeom prst="rect">
+            <a:avLst/>
+          </a:prstGeom>
+          <a:noFill/>
+          <a:ln>
+            <a:noFill/>
+          </a:ln>
+        </p:spPr>
+        <p:style>
+          <a:lnRef idx="2">
+            <a:schemeClr val="accent1">
+              <a:shade val="50000"/>
+            </a:schemeClr>
+          </a:lnRef>
+          <a:fillRef idx="1">
+            <a:schemeClr val="accent1"/>
+          </a:fillRef>
+          <a:effectRef idx="0">
+            <a:schemeClr val="accent1"/>
+          </a:effectRef>
+          <a:fontRef idx="minor">
+            <a:schemeClr val="lt1"/>
+          </a:fontRef>
+        </p:style>
+        <p:txBody>
+          <a:bodyPr rtlCol="0" anchor="ctr"/>
+          <a:lstStyle/>
+          <a:p>
+            <a:pPr algn="ctr"/>
+            <a:endParaRPr lang="en-US"/>
+          </a:p>
+        </p:txBody>
+      </p:sp>
+      <p:cxnSp>
+        <p:nvCxnSpPr>
+          <p:cNvPr id="86" name="Conector: angular 85">
+            <a:extLst>
+              <a:ext uri="{FF2B5EF4-FFF2-40B4-BE49-F238E27FC236}">
+                <a16:creationId xmlns:a16="http://schemas.microsoft.com/office/drawing/2014/main" id="{D8C190D0-6B3D-4DC3-868A-1FCCC55B5BCA}"/>
+              </a:ext>
+            </a:extLst>
+          </p:cNvPr>
+          <p:cNvCxnSpPr>
+            <a:cxnSpLocks/>
+            <a:stCxn id="82" idx="2"/>
+            <a:endCxn id="11" idx="0"/>
+          </p:cNvCxnSpPr>
+          <p:nvPr/>
+        </p:nvCxnSpPr>
+        <p:spPr>
+          <a:xfrm flipH="1" flipV="1">
+            <a:off x="6650600" y="3232858"/>
+            <a:ext cx="10434" cy="894503"/>
+          </a:xfrm>
+          <a:prstGeom prst="straightConnector1">
+            <a:avLst/>
+          </a:prstGeom>
+          <a:ln w="25400">
+            <a:solidFill>
+              <a:schemeClr val="tx1"/>
+            </a:solidFill>
+            <a:tailEnd type="arrow" w="med" len="lg"/>
+          </a:ln>
+        </p:spPr>
+        <p:style>
+          <a:lnRef idx="1">
+            <a:schemeClr val="accent1"/>
+          </a:lnRef>
+          <a:fillRef idx="0">
+            <a:schemeClr val="accent1"/>
+          </a:fillRef>
+          <a:effectRef idx="0">
+            <a:schemeClr val="accent1"/>
+          </a:effectRef>
+          <a:fontRef idx="minor">
+            <a:schemeClr val="tx1"/>
+          </a:fontRef>
+        </p:style>
+      </p:cxnSp>
+      <p:sp>
+        <p:nvSpPr>
+          <p:cNvPr id="89" name="CuadroTexto 88">
+            <a:extLst>
+              <a:ext uri="{FF2B5EF4-FFF2-40B4-BE49-F238E27FC236}">
+                <a16:creationId xmlns:a16="http://schemas.microsoft.com/office/drawing/2014/main" id="{868C342D-C233-44BD-8ABC-51658779AD68}"/>
+              </a:ext>
+            </a:extLst>
+          </p:cNvPr>
+          <p:cNvSpPr txBox="1"/>
+          <p:nvPr/>
+        </p:nvSpPr>
+        <p:spPr>
+          <a:xfrm>
+            <a:off x="5279406" y="4130891"/>
+            <a:ext cx="1336713" cy="338554"/>
+          </a:xfrm>
+          <a:prstGeom prst="rect">
+            <a:avLst/>
+          </a:prstGeom>
+          <a:noFill/>
+        </p:spPr>
+        <p:txBody>
+          <a:bodyPr wrap="none" rtlCol="0">
+            <a:spAutoFit/>
+          </a:bodyPr>
+          <a:lstStyle/>
+          <a:p>
+            <a:r>
+              <a:rPr lang="en-US" sz="1600" b="1" dirty="0">
+                <a:solidFill>
+                  <a:schemeClr val="accent2"/>
+                </a:solidFill>
+              </a:rPr>
+              <a:t>PULL Request</a:t>
+            </a:r>
+          </a:p>
+        </p:txBody>
+      </p:sp>
+      <p:sp>
+        <p:nvSpPr>
+          <p:cNvPr id="90" name="Rectángulo 89">
+            <a:extLst>
+              <a:ext uri="{FF2B5EF4-FFF2-40B4-BE49-F238E27FC236}">
+                <a16:creationId xmlns:a16="http://schemas.microsoft.com/office/drawing/2014/main" id="{4B7FFECA-BEA9-4149-8ABB-C7920C619ED9}"/>
+              </a:ext>
+            </a:extLst>
+          </p:cNvPr>
+          <p:cNvSpPr/>
+          <p:nvPr/>
+        </p:nvSpPr>
+        <p:spPr>
+          <a:xfrm>
+            <a:off x="7037684" y="2305832"/>
+            <a:ext cx="914400" cy="914400"/>
+          </a:xfrm>
+          <a:prstGeom prst="rect">
+            <a:avLst/>
+          </a:prstGeom>
+          <a:noFill/>
+          <a:ln>
+            <a:noFill/>
+          </a:ln>
+        </p:spPr>
+        <p:style>
+          <a:lnRef idx="2">
+            <a:schemeClr val="accent1">
+              <a:shade val="50000"/>
+            </a:schemeClr>
+          </a:lnRef>
+          <a:fillRef idx="1">
+            <a:schemeClr val="accent1"/>
+          </a:fillRef>
+          <a:effectRef idx="0">
+            <a:schemeClr val="accent1"/>
+          </a:effectRef>
+          <a:fontRef idx="minor">
+            <a:schemeClr val="lt1"/>
+          </a:fontRef>
+        </p:style>
+        <p:txBody>
+          <a:bodyPr rtlCol="0" anchor="ctr"/>
+          <a:lstStyle/>
+          <a:p>
+            <a:pPr algn="ctr"/>
+            <a:endParaRPr lang="en-US"/>
+          </a:p>
+        </p:txBody>
+      </p:sp>
+      <p:cxnSp>
+        <p:nvCxnSpPr>
+          <p:cNvPr id="97" name="Conector: angular 85">
+            <a:extLst>
+              <a:ext uri="{FF2B5EF4-FFF2-40B4-BE49-F238E27FC236}">
+                <a16:creationId xmlns:a16="http://schemas.microsoft.com/office/drawing/2014/main" id="{8005C341-7927-4EF5-BF6C-154AF4DB0F82}"/>
+              </a:ext>
+            </a:extLst>
+          </p:cNvPr>
+          <p:cNvCxnSpPr>
+            <a:cxnSpLocks/>
+            <a:stCxn id="90" idx="0"/>
+            <a:endCxn id="90" idx="2"/>
+          </p:cNvCxnSpPr>
+          <p:nvPr/>
+        </p:nvCxnSpPr>
+        <p:spPr>
+          <a:xfrm>
+            <a:off x="7494884" y="2305832"/>
+            <a:ext cx="0" cy="914400"/>
+          </a:xfrm>
+          <a:prstGeom prst="straightConnector1">
+            <a:avLst/>
+          </a:prstGeom>
+          <a:ln w="25400">
+            <a:solidFill>
+              <a:schemeClr val="tx1"/>
+            </a:solidFill>
+            <a:tailEnd type="arrow" w="med" len="lg"/>
+          </a:ln>
+        </p:spPr>
+        <p:style>
+          <a:lnRef idx="1">
+            <a:schemeClr val="accent1"/>
+          </a:lnRef>
+          <a:fillRef idx="0">
+            <a:schemeClr val="accent1"/>
+          </a:fillRef>
+          <a:effectRef idx="0">
+            <a:schemeClr val="accent1"/>
+          </a:effectRef>
+          <a:fontRef idx="minor">
+            <a:schemeClr val="tx1"/>
+          </a:fontRef>
+        </p:style>
+      </p:cxnSp>
+      <p:sp>
+        <p:nvSpPr>
+          <p:cNvPr id="100" name="CuadroTexto 99">
+            <a:extLst>
+              <a:ext uri="{FF2B5EF4-FFF2-40B4-BE49-F238E27FC236}">
+                <a16:creationId xmlns:a16="http://schemas.microsoft.com/office/drawing/2014/main" id="{A2B40A4D-46EA-4A0F-B47F-AF0A9FE8F2EF}"/>
+              </a:ext>
+            </a:extLst>
+          </p:cNvPr>
+          <p:cNvSpPr txBox="1"/>
+          <p:nvPr/>
+        </p:nvSpPr>
+        <p:spPr>
+          <a:xfrm>
+            <a:off x="7517549" y="2026113"/>
+            <a:ext cx="1336713" cy="338554"/>
+          </a:xfrm>
+          <a:prstGeom prst="rect">
+            <a:avLst/>
+          </a:prstGeom>
+          <a:noFill/>
+        </p:spPr>
+        <p:txBody>
+          <a:bodyPr wrap="none" rtlCol="0">
+            <a:spAutoFit/>
+          </a:bodyPr>
+          <a:lstStyle/>
+          <a:p>
+            <a:r>
+              <a:rPr lang="en-US" sz="1600" b="1" dirty="0">
+                <a:solidFill>
+                  <a:schemeClr val="accent6"/>
+                </a:solidFill>
+              </a:rPr>
+              <a:t>PULL Request</a:t>
+            </a:r>
+          </a:p>
+        </p:txBody>
+      </p:sp>
+      <p:sp>
+        <p:nvSpPr>
+          <p:cNvPr id="108" name="CuadroTexto 107">
+            <a:extLst>
+              <a:ext uri="{FF2B5EF4-FFF2-40B4-BE49-F238E27FC236}">
+                <a16:creationId xmlns:a16="http://schemas.microsoft.com/office/drawing/2014/main" id="{A8AE0DA7-DFD0-42F2-A63F-DE2B3010F0AC}"/>
+              </a:ext>
+            </a:extLst>
+          </p:cNvPr>
+          <p:cNvSpPr txBox="1"/>
+          <p:nvPr/>
+        </p:nvSpPr>
+        <p:spPr>
+          <a:xfrm>
+            <a:off x="5429227" y="5091526"/>
+            <a:ext cx="1847493" cy="584775"/>
+          </a:xfrm>
+          <a:prstGeom prst="rect">
+            <a:avLst/>
+          </a:prstGeom>
+          <a:noFill/>
+        </p:spPr>
+        <p:txBody>
+          <a:bodyPr wrap="none" rtlCol="0">
+            <a:spAutoFit/>
+          </a:bodyPr>
+          <a:lstStyle/>
+          <a:p>
+            <a:pPr algn="ctr"/>
+            <a:r>
+              <a:rPr lang="en-US" sz="1600" b="1" dirty="0" err="1">
+                <a:solidFill>
+                  <a:schemeClr val="accent2"/>
+                </a:solidFill>
+              </a:rPr>
+              <a:t>TaskA</a:t>
+            </a:r>
+            <a:r>
+              <a:rPr lang="en-US" sz="1600" b="1" dirty="0">
+                <a:solidFill>
+                  <a:schemeClr val="accent2"/>
+                </a:solidFill>
+              </a:rPr>
+              <a:t> Finished and </a:t>
+            </a:r>
+          </a:p>
+          <a:p>
+            <a:pPr algn="ctr"/>
+            <a:r>
+              <a:rPr lang="en-US" sz="1600" b="1" dirty="0">
+                <a:solidFill>
+                  <a:schemeClr val="accent2"/>
+                </a:solidFill>
+              </a:rPr>
+              <a:t>working properly</a:t>
+            </a:r>
+          </a:p>
+        </p:txBody>
+      </p:sp>
+      <p:sp>
+        <p:nvSpPr>
+          <p:cNvPr id="109" name="CuadroTexto 108">
+            <a:extLst>
+              <a:ext uri="{FF2B5EF4-FFF2-40B4-BE49-F238E27FC236}">
+                <a16:creationId xmlns:a16="http://schemas.microsoft.com/office/drawing/2014/main" id="{7D3C2D0D-A1B7-40F9-A1E5-05E64EFAAC9C}"/>
+              </a:ext>
+            </a:extLst>
+          </p:cNvPr>
+          <p:cNvSpPr txBox="1"/>
+          <p:nvPr/>
+        </p:nvSpPr>
+        <p:spPr>
+          <a:xfrm>
+            <a:off x="6575946" y="845800"/>
+            <a:ext cx="1837875" cy="584775"/>
+          </a:xfrm>
+          <a:prstGeom prst="rect">
+            <a:avLst/>
+          </a:prstGeom>
+          <a:noFill/>
+        </p:spPr>
+        <p:txBody>
+          <a:bodyPr wrap="none" rtlCol="0">
+            <a:spAutoFit/>
+          </a:bodyPr>
+          <a:lstStyle/>
+          <a:p>
+            <a:pPr algn="ctr"/>
+            <a:r>
+              <a:rPr lang="en-US" sz="1600" b="1" dirty="0" err="1">
+                <a:solidFill>
+                  <a:schemeClr val="accent6"/>
+                </a:solidFill>
+              </a:rPr>
+              <a:t>TaskB</a:t>
+            </a:r>
+            <a:r>
+              <a:rPr lang="en-US" sz="1600" b="1" dirty="0">
+                <a:solidFill>
+                  <a:schemeClr val="accent6"/>
+                </a:solidFill>
+              </a:rPr>
+              <a:t> Finished and </a:t>
+            </a:r>
+          </a:p>
+          <a:p>
+            <a:pPr algn="ctr"/>
+            <a:r>
+              <a:rPr lang="en-US" sz="1600" b="1" dirty="0">
+                <a:solidFill>
+                  <a:schemeClr val="accent6"/>
+                </a:solidFill>
+              </a:rPr>
+              <a:t>working properly</a:t>
+            </a:r>
+          </a:p>
+        </p:txBody>
+      </p:sp>
+      <p:sp>
+        <p:nvSpPr>
+          <p:cNvPr id="120" name="Rectángulo 119">
+            <a:extLst>
+              <a:ext uri="{FF2B5EF4-FFF2-40B4-BE49-F238E27FC236}">
+                <a16:creationId xmlns:a16="http://schemas.microsoft.com/office/drawing/2014/main" id="{87A56CD0-E7BA-4E92-9A6E-DD859C36A43F}"/>
+              </a:ext>
+            </a:extLst>
+          </p:cNvPr>
+          <p:cNvSpPr/>
+          <p:nvPr/>
+        </p:nvSpPr>
+        <p:spPr>
+          <a:xfrm>
+            <a:off x="8227314" y="4546163"/>
+            <a:ext cx="1080071" cy="960239"/>
+          </a:xfrm>
+          <a:prstGeom prst="rect">
+            <a:avLst/>
+          </a:prstGeom>
+          <a:noFill/>
+          <a:ln>
+            <a:noFill/>
+          </a:ln>
+        </p:spPr>
+        <p:style>
+          <a:lnRef idx="2">
+            <a:schemeClr val="accent1">
+              <a:shade val="50000"/>
+            </a:schemeClr>
+          </a:lnRef>
+          <a:fillRef idx="1">
+            <a:schemeClr val="accent1"/>
+          </a:fillRef>
+          <a:effectRef idx="0">
+            <a:schemeClr val="accent1"/>
+          </a:effectRef>
+          <a:fontRef idx="minor">
+            <a:schemeClr val="lt1"/>
+          </a:fontRef>
+        </p:style>
+        <p:txBody>
+          <a:bodyPr rtlCol="0" anchor="ctr"/>
+          <a:lstStyle/>
+          <a:p>
+            <a:pPr algn="ctr"/>
             <a:r>
               <a:rPr lang="en-US" sz="2000" dirty="0">
                 <a:solidFill>
@@ -6409,8 +6382,8 @@
         </p:nvSpPr>
         <p:spPr>
           <a:xfrm>
-            <a:off x="8010057" y="3862515"/>
-            <a:ext cx="1881707" cy="461665"/>
+            <a:off x="7740715" y="3619703"/>
+            <a:ext cx="2274059" cy="584775"/>
           </a:xfrm>
           <a:prstGeom prst="rect">
             <a:avLst/>
@@ -6429,7 +6402,7 @@
           <a:lstStyle/>
           <a:p>
             <a:r>
-              <a:rPr lang="en-US" sz="1200" b="1" dirty="0">
+              <a:rPr lang="en-US" sz="1600" b="1" dirty="0">
                 <a:solidFill>
                   <a:srgbClr val="FF0000"/>
                 </a:solidFill>
@@ -6439,7 +6412,7 @@
           </a:p>
           <a:p>
             <a:r>
-              <a:rPr lang="en-US" sz="1200" b="1" dirty="0">
+              <a:rPr lang="en-US" sz="1600" b="1" dirty="0">
                 <a:solidFill>
                   <a:srgbClr val="FF0000"/>
                 </a:solidFill>
@@ -6466,8 +6439,8 @@
         </p:nvCxnSpPr>
         <p:spPr>
           <a:xfrm flipH="1" flipV="1">
-            <a:off x="6962736" y="3256364"/>
-            <a:ext cx="1047321" cy="836984"/>
+            <a:off x="6971225" y="3251845"/>
+            <a:ext cx="769490" cy="660246"/>
           </a:xfrm>
           <a:prstGeom prst="straightConnector1">
             <a:avLst/>
@@ -6508,8 +6481,8 @@
         </p:nvSpPr>
         <p:spPr>
           <a:xfrm>
-            <a:off x="4061494" y="3599529"/>
-            <a:ext cx="1459260" cy="461665"/>
+            <a:off x="3664503" y="3439285"/>
+            <a:ext cx="1875362" cy="584775"/>
           </a:xfrm>
           <a:prstGeom prst="rect">
             <a:avLst/>
@@ -6528,7 +6501,7 @@
           <a:lstStyle/>
           <a:p>
             <a:r>
-              <a:rPr lang="en-US" sz="1200" b="1" dirty="0">
+              <a:rPr lang="en-US" sz="1600" b="1" dirty="0">
                 <a:solidFill>
                   <a:srgbClr val="FF0000"/>
                 </a:solidFill>
@@ -6538,7 +6511,7 @@
           </a:p>
           <a:p>
             <a:r>
-              <a:rPr lang="en-US" sz="1200" b="1" dirty="0">
+              <a:rPr lang="en-US" sz="1600" b="1" dirty="0">
                 <a:solidFill>
                   <a:srgbClr val="FF0000"/>
                 </a:solidFill>
@@ -6566,8 +6539,8 @@
         </p:nvCxnSpPr>
         <p:spPr>
           <a:xfrm flipV="1">
-            <a:off x="5520754" y="3238298"/>
-            <a:ext cx="1142458" cy="592064"/>
+            <a:off x="5539865" y="3232858"/>
+            <a:ext cx="1110735" cy="498815"/>
           </a:xfrm>
           <a:prstGeom prst="straightConnector1">
             <a:avLst/>
@@ -6723,7 +6696,7 @@
             <a:avLst/>
           </a:prstGeom>
           <a:solidFill>
-            <a:srgbClr val="ACACAC"/>
+            <a:schemeClr val="bg1"/>
           </a:solidFill>
           <a:ln w="25400">
             <a:solidFill>
@@ -6777,7 +6750,7 @@
             <a:avLst/>
           </a:prstGeom>
           <a:solidFill>
-            <a:srgbClr val="ACACAC"/>
+            <a:schemeClr val="bg1"/>
           </a:solidFill>
           <a:ln w="25400">
             <a:solidFill>
@@ -6831,7 +6804,7 @@
             <a:avLst/>
           </a:prstGeom>
           <a:solidFill>
-            <a:srgbClr val="ACACAC"/>
+            <a:schemeClr val="bg1"/>
           </a:solidFill>
           <a:ln w="25400">
             <a:solidFill>
@@ -6878,8 +6851,8 @@
         </p:nvSpPr>
         <p:spPr>
           <a:xfrm>
-            <a:off x="5452805" y="1105463"/>
-            <a:ext cx="733727" cy="276999"/>
+            <a:off x="5400965" y="1074287"/>
+            <a:ext cx="916213" cy="338554"/>
           </a:xfrm>
           <a:prstGeom prst="rect">
             <a:avLst/>
@@ -6894,7 +6867,11 @@
           <a:p>
             <a:pPr algn="ctr"/>
             <a:r>
-              <a:rPr lang="en-US" sz="1200" b="1" dirty="0"/>
+              <a:rPr lang="en-US" sz="1600" b="1" dirty="0">
+                <a:solidFill>
+                  <a:schemeClr val="accent6"/>
+                </a:solidFill>
+              </a:rPr>
               <a:t>commits</a:t>
             </a:r>
           </a:p>

</xml_diff>